<commit_message>
Edited powerpoint and bugfixes
</commit_message>
<xml_diff>
--- a/Meeting Presentations/03.11.2022_General_meeting.pptx
+++ b/Meeting Presentations/03.11.2022_General_meeting.pptx
@@ -8,12 +8,18 @@
     <p:sldId id="256" r:id="rId2"/>
     <p:sldId id="257" r:id="rId3"/>
     <p:sldId id="258" r:id="rId4"/>
-    <p:sldId id="262" r:id="rId5"/>
-    <p:sldId id="264" r:id="rId6"/>
-    <p:sldId id="259" r:id="rId7"/>
-    <p:sldId id="260" r:id="rId8"/>
-    <p:sldId id="261" r:id="rId9"/>
-    <p:sldId id="263" r:id="rId10"/>
+    <p:sldId id="266" r:id="rId5"/>
+    <p:sldId id="262" r:id="rId6"/>
+    <p:sldId id="264" r:id="rId7"/>
+    <p:sldId id="259" r:id="rId8"/>
+    <p:sldId id="260" r:id="rId9"/>
+    <p:sldId id="261" r:id="rId10"/>
+    <p:sldId id="263" r:id="rId11"/>
+    <p:sldId id="265" r:id="rId12"/>
+    <p:sldId id="267" r:id="rId13"/>
+    <p:sldId id="268" r:id="rId14"/>
+    <p:sldId id="269" r:id="rId15"/>
+    <p:sldId id="270" r:id="rId16"/>
   </p:sldIdLst>
   <p:sldSz cx="12192000" cy="6858000"/>
   <p:notesSz cx="6858000" cy="9144000"/>
@@ -112,6 +118,11 @@
       </a:defRPr>
     </a:lvl9pPr>
   </p:defaultTextStyle>
+  <p:extLst>
+    <p:ext uri="{EFAFB233-063F-42B5-8137-9DF3F51BA10A}">
+      <p15:sldGuideLst xmlns:p15="http://schemas.microsoft.com/office/powerpoint/2012/main"/>
+    </p:ext>
+  </p:extLst>
 </p:presentation>
 </file>
 
@@ -315,7 +326,7 @@
           <a:p>
             <a:fld id="{AE2E62AD-754A-40FC-A660-072484288696}" type="datetimeFigureOut">
               <a:rPr lang="en-GB" smtClean="0"/>
-              <a:t>01/11/2022</a:t>
+              <a:t>02/11/2022</a:t>
             </a:fld>
             <a:endParaRPr lang="en-GB"/>
           </a:p>
@@ -505,7 +516,7 @@
           <a:p>
             <a:fld id="{AE2E62AD-754A-40FC-A660-072484288696}" type="datetimeFigureOut">
               <a:rPr lang="en-GB" smtClean="0"/>
-              <a:t>01/11/2022</a:t>
+              <a:t>02/11/2022</a:t>
             </a:fld>
             <a:endParaRPr lang="en-GB"/>
           </a:p>
@@ -685,7 +696,7 @@
           <a:p>
             <a:fld id="{AE2E62AD-754A-40FC-A660-072484288696}" type="datetimeFigureOut">
               <a:rPr lang="en-GB" smtClean="0"/>
-              <a:t>01/11/2022</a:t>
+              <a:t>02/11/2022</a:t>
             </a:fld>
             <a:endParaRPr lang="en-GB"/>
           </a:p>
@@ -855,7 +866,7 @@
           <a:p>
             <a:fld id="{AE2E62AD-754A-40FC-A660-072484288696}" type="datetimeFigureOut">
               <a:rPr lang="en-GB" smtClean="0"/>
-              <a:t>01/11/2022</a:t>
+              <a:t>02/11/2022</a:t>
             </a:fld>
             <a:endParaRPr lang="en-GB"/>
           </a:p>
@@ -1111,7 +1122,7 @@
           <a:p>
             <a:fld id="{AE2E62AD-754A-40FC-A660-072484288696}" type="datetimeFigureOut">
               <a:rPr lang="en-GB" smtClean="0"/>
-              <a:t>01/11/2022</a:t>
+              <a:t>02/11/2022</a:t>
             </a:fld>
             <a:endParaRPr lang="en-GB"/>
           </a:p>
@@ -1399,7 +1410,7 @@
           <a:p>
             <a:fld id="{AE2E62AD-754A-40FC-A660-072484288696}" type="datetimeFigureOut">
               <a:rPr lang="en-GB" smtClean="0"/>
-              <a:t>01/11/2022</a:t>
+              <a:t>02/11/2022</a:t>
             </a:fld>
             <a:endParaRPr lang="en-GB"/>
           </a:p>
@@ -1837,7 +1848,7 @@
           <a:p>
             <a:fld id="{AE2E62AD-754A-40FC-A660-072484288696}" type="datetimeFigureOut">
               <a:rPr lang="en-GB" smtClean="0"/>
-              <a:t>01/11/2022</a:t>
+              <a:t>02/11/2022</a:t>
             </a:fld>
             <a:endParaRPr lang="en-GB"/>
           </a:p>
@@ -1955,7 +1966,7 @@
           <a:p>
             <a:fld id="{AE2E62AD-754A-40FC-A660-072484288696}" type="datetimeFigureOut">
               <a:rPr lang="en-GB" smtClean="0"/>
-              <a:t>01/11/2022</a:t>
+              <a:t>02/11/2022</a:t>
             </a:fld>
             <a:endParaRPr lang="en-GB"/>
           </a:p>
@@ -2050,7 +2061,7 @@
           <a:p>
             <a:fld id="{AE2E62AD-754A-40FC-A660-072484288696}" type="datetimeFigureOut">
               <a:rPr lang="en-GB" smtClean="0"/>
-              <a:t>01/11/2022</a:t>
+              <a:t>02/11/2022</a:t>
             </a:fld>
             <a:endParaRPr lang="en-GB"/>
           </a:p>
@@ -2406,7 +2417,7 @@
           <a:p>
             <a:fld id="{AE2E62AD-754A-40FC-A660-072484288696}" type="datetimeFigureOut">
               <a:rPr lang="en-GB" smtClean="0"/>
-              <a:t>01/11/2022</a:t>
+              <a:t>02/11/2022</a:t>
             </a:fld>
             <a:endParaRPr lang="en-GB"/>
           </a:p>
@@ -2722,7 +2733,7 @@
           <a:p>
             <a:fld id="{AE2E62AD-754A-40FC-A660-072484288696}" type="datetimeFigureOut">
               <a:rPr lang="en-GB" smtClean="0"/>
-              <a:t>01/11/2022</a:t>
+              <a:t>02/11/2022</a:t>
             </a:fld>
             <a:endParaRPr lang="en-GB"/>
           </a:p>
@@ -2955,7 +2966,7 @@
           <a:p>
             <a:fld id="{AE2E62AD-754A-40FC-A660-072484288696}" type="datetimeFigureOut">
               <a:rPr lang="en-GB" smtClean="0"/>
-              <a:t>01/11/2022</a:t>
+              <a:t>02/11/2022</a:t>
             </a:fld>
             <a:endParaRPr lang="en-GB"/>
           </a:p>
@@ -3470,1393 +3481,7 @@
 </p:sld>
 </file>
 
-<file path=ppt/slides/slide2.xml><?xml version="1.0" encoding="utf-8"?>
-<p:sld xmlns:a="http://schemas.openxmlformats.org/drawingml/2006/main" xmlns:r="http://schemas.openxmlformats.org/officeDocument/2006/relationships" xmlns:p="http://schemas.openxmlformats.org/presentationml/2006/main">
-  <p:cSld>
-    <p:spTree>
-      <p:nvGrpSpPr>
-        <p:cNvPr id="1" name=""/>
-        <p:cNvGrpSpPr/>
-        <p:nvPr/>
-      </p:nvGrpSpPr>
-      <p:grpSpPr>
-        <a:xfrm>
-          <a:off x="0" y="0"/>
-          <a:ext cx="0" cy="0"/>
-          <a:chOff x="0" y="0"/>
-          <a:chExt cx="0" cy="0"/>
-        </a:xfrm>
-      </p:grpSpPr>
-      <p:sp>
-        <p:nvSpPr>
-          <p:cNvPr id="2" name="Title 1">
-            <a:extLst>
-              <a:ext uri="{FF2B5EF4-FFF2-40B4-BE49-F238E27FC236}">
-                <a16:creationId xmlns:a16="http://schemas.microsoft.com/office/drawing/2014/main" id="{BC0DA141-5424-46C4-ACB1-4974D042573C}"/>
-              </a:ext>
-            </a:extLst>
-          </p:cNvPr>
-          <p:cNvSpPr>
-            <a:spLocks noGrp="1"/>
-          </p:cNvSpPr>
-          <p:nvPr>
-            <p:ph type="title"/>
-          </p:nvPr>
-        </p:nvSpPr>
-        <p:spPr/>
-        <p:txBody>
-          <a:bodyPr/>
-          <a:lstStyle/>
-          <a:p>
-            <a:r>
-              <a:rPr lang="nb-NO" dirty="0">
-                <a:solidFill>
-                  <a:schemeClr val="tx1"/>
-                </a:solidFill>
-              </a:rPr>
-              <a:t>Contents/</a:t>
-            </a:r>
-            <a:r>
-              <a:rPr lang="nb-NO" dirty="0" err="1">
-                <a:solidFill>
-                  <a:schemeClr val="tx1"/>
-                </a:solidFill>
-              </a:rPr>
-              <a:t>motivations</a:t>
-            </a:r>
-            <a:endParaRPr lang="en-GB" dirty="0">
-              <a:solidFill>
-                <a:schemeClr val="tx1"/>
-              </a:solidFill>
-            </a:endParaRPr>
-          </a:p>
-        </p:txBody>
-      </p:sp>
-      <p:sp>
-        <p:nvSpPr>
-          <p:cNvPr id="3" name="Content Placeholder 2">
-            <a:extLst>
-              <a:ext uri="{FF2B5EF4-FFF2-40B4-BE49-F238E27FC236}">
-                <a16:creationId xmlns:a16="http://schemas.microsoft.com/office/drawing/2014/main" id="{6F2B10CC-4B8C-41C3-A74A-91827D205A50}"/>
-              </a:ext>
-            </a:extLst>
-          </p:cNvPr>
-          <p:cNvSpPr>
-            <a:spLocks noGrp="1"/>
-          </p:cNvSpPr>
-          <p:nvPr>
-            <p:ph idx="1"/>
-          </p:nvPr>
-        </p:nvSpPr>
-        <p:spPr/>
-        <p:txBody>
-          <a:bodyPr/>
-          <a:lstStyle/>
-          <a:p>
-            <a:r>
-              <a:rPr lang="nb-NO" dirty="0"/>
-              <a:t>Second to last </a:t>
-            </a:r>
-            <a:r>
-              <a:rPr lang="nb-NO" dirty="0" err="1"/>
-              <a:t>meeting</a:t>
-            </a:r>
-            <a:r>
-              <a:rPr lang="nb-NO" dirty="0"/>
-              <a:t> </a:t>
-            </a:r>
-            <a:r>
-              <a:rPr lang="nb-NO" dirty="0" err="1"/>
-              <a:t>of</a:t>
-            </a:r>
-            <a:r>
-              <a:rPr lang="nb-NO" dirty="0"/>
-              <a:t> </a:t>
-            </a:r>
-            <a:r>
-              <a:rPr lang="nb-NO" dirty="0" err="1"/>
-              <a:t>the</a:t>
-            </a:r>
-            <a:r>
-              <a:rPr lang="nb-NO" dirty="0"/>
-              <a:t> semester</a:t>
-            </a:r>
-          </a:p>
-          <a:p>
-            <a:r>
-              <a:rPr lang="nb-NO" dirty="0"/>
-              <a:t>Status </a:t>
-            </a:r>
-            <a:r>
-              <a:rPr lang="nb-NO" dirty="0" err="1"/>
-              <a:t>update</a:t>
-            </a:r>
-            <a:endParaRPr lang="nb-NO" dirty="0"/>
-          </a:p>
-          <a:p>
-            <a:endParaRPr lang="en-GB" dirty="0"/>
-          </a:p>
-        </p:txBody>
-      </p:sp>
-    </p:spTree>
-    <p:extLst>
-      <p:ext uri="{BB962C8B-B14F-4D97-AF65-F5344CB8AC3E}">
-        <p14:creationId xmlns:p14="http://schemas.microsoft.com/office/powerpoint/2010/main" val="2505827935"/>
-      </p:ext>
-    </p:extLst>
-  </p:cSld>
-  <p:clrMapOvr>
-    <a:masterClrMapping/>
-  </p:clrMapOvr>
-</p:sld>
-</file>
-
-<file path=ppt/slides/slide3.xml><?xml version="1.0" encoding="utf-8"?>
-<p:sld xmlns:a="http://schemas.openxmlformats.org/drawingml/2006/main" xmlns:r="http://schemas.openxmlformats.org/officeDocument/2006/relationships" xmlns:p="http://schemas.openxmlformats.org/presentationml/2006/main">
-  <p:cSld>
-    <p:spTree>
-      <p:nvGrpSpPr>
-        <p:cNvPr id="1" name=""/>
-        <p:cNvGrpSpPr/>
-        <p:nvPr/>
-      </p:nvGrpSpPr>
-      <p:grpSpPr>
-        <a:xfrm>
-          <a:off x="0" y="0"/>
-          <a:ext cx="0" cy="0"/>
-          <a:chOff x="0" y="0"/>
-          <a:chExt cx="0" cy="0"/>
-        </a:xfrm>
-      </p:grpSpPr>
-      <p:sp>
-        <p:nvSpPr>
-          <p:cNvPr id="2" name="Title 1">
-            <a:extLst>
-              <a:ext uri="{FF2B5EF4-FFF2-40B4-BE49-F238E27FC236}">
-                <a16:creationId xmlns:a16="http://schemas.microsoft.com/office/drawing/2014/main" id="{E7B5AC05-0A0D-4605-B4E2-1C92DEEB4F3C}"/>
-              </a:ext>
-            </a:extLst>
-          </p:cNvPr>
-          <p:cNvSpPr>
-            <a:spLocks noGrp="1"/>
-          </p:cNvSpPr>
-          <p:nvPr>
-            <p:ph type="title"/>
-          </p:nvPr>
-        </p:nvSpPr>
-        <p:spPr/>
-        <p:txBody>
-          <a:bodyPr/>
-          <a:lstStyle/>
-          <a:p>
-            <a:r>
-              <a:rPr lang="nb-NO" dirty="0">
-                <a:solidFill>
-                  <a:schemeClr val="tx1"/>
-                </a:solidFill>
-              </a:rPr>
-              <a:t>Progress</a:t>
-            </a:r>
-            <a:endParaRPr lang="en-GB" dirty="0">
-              <a:solidFill>
-                <a:schemeClr val="tx1"/>
-              </a:solidFill>
-            </a:endParaRPr>
-          </a:p>
-        </p:txBody>
-      </p:sp>
-      <p:sp>
-        <p:nvSpPr>
-          <p:cNvPr id="3" name="Content Placeholder 2">
-            <a:extLst>
-              <a:ext uri="{FF2B5EF4-FFF2-40B4-BE49-F238E27FC236}">
-                <a16:creationId xmlns:a16="http://schemas.microsoft.com/office/drawing/2014/main" id="{F8AF6BE8-0F5C-47CF-8DE1-30743428E43D}"/>
-              </a:ext>
-            </a:extLst>
-          </p:cNvPr>
-          <p:cNvSpPr>
-            <a:spLocks noGrp="1"/>
-          </p:cNvSpPr>
-          <p:nvPr>
-            <p:ph idx="1"/>
-          </p:nvPr>
-        </p:nvSpPr>
-        <p:spPr/>
-        <p:txBody>
-          <a:bodyPr/>
-          <a:lstStyle/>
-          <a:p>
-            <a:r>
-              <a:rPr lang="nb-NO" dirty="0"/>
-              <a:t>~1000 lines </a:t>
-            </a:r>
-            <a:r>
-              <a:rPr lang="nb-NO" dirty="0" err="1"/>
-              <a:t>of</a:t>
-            </a:r>
-            <a:r>
-              <a:rPr lang="nb-NO" dirty="0"/>
-              <a:t> </a:t>
-            </a:r>
-            <a:r>
-              <a:rPr lang="nb-NO" dirty="0" err="1"/>
-              <a:t>code</a:t>
-            </a:r>
-            <a:r>
-              <a:rPr lang="nb-NO" dirty="0"/>
-              <a:t> has </a:t>
-            </a:r>
-            <a:r>
-              <a:rPr lang="nb-NO" dirty="0" err="1"/>
-              <a:t>been</a:t>
-            </a:r>
-            <a:r>
-              <a:rPr lang="nb-NO" dirty="0"/>
-              <a:t> </a:t>
-            </a:r>
-            <a:r>
-              <a:rPr lang="nb-NO" dirty="0" err="1"/>
-              <a:t>written</a:t>
-            </a:r>
-            <a:endParaRPr lang="nb-NO" dirty="0"/>
-          </a:p>
-          <a:p>
-            <a:r>
-              <a:rPr lang="en-GB" dirty="0"/>
-              <a:t>Many model runs have been done to test the model</a:t>
-            </a:r>
-          </a:p>
-        </p:txBody>
-      </p:sp>
-    </p:spTree>
-    <p:extLst>
-      <p:ext uri="{BB962C8B-B14F-4D97-AF65-F5344CB8AC3E}">
-        <p14:creationId xmlns:p14="http://schemas.microsoft.com/office/powerpoint/2010/main" val="4189716457"/>
-      </p:ext>
-    </p:extLst>
-  </p:cSld>
-  <p:clrMapOvr>
-    <a:masterClrMapping/>
-  </p:clrMapOvr>
-</p:sld>
-</file>
-
-<file path=ppt/slides/slide4.xml><?xml version="1.0" encoding="utf-8"?>
-<p:sld xmlns:a="http://schemas.openxmlformats.org/drawingml/2006/main" xmlns:r="http://schemas.openxmlformats.org/officeDocument/2006/relationships" xmlns:p="http://schemas.openxmlformats.org/presentationml/2006/main">
-  <p:cSld>
-    <p:spTree>
-      <p:nvGrpSpPr>
-        <p:cNvPr id="1" name=""/>
-        <p:cNvGrpSpPr/>
-        <p:nvPr/>
-      </p:nvGrpSpPr>
-      <p:grpSpPr>
-        <a:xfrm>
-          <a:off x="0" y="0"/>
-          <a:ext cx="0" cy="0"/>
-          <a:chOff x="0" y="0"/>
-          <a:chExt cx="0" cy="0"/>
-        </a:xfrm>
-      </p:grpSpPr>
-      <p:sp>
-        <p:nvSpPr>
-          <p:cNvPr id="2" name="Title 1">
-            <a:extLst>
-              <a:ext uri="{FF2B5EF4-FFF2-40B4-BE49-F238E27FC236}">
-                <a16:creationId xmlns:a16="http://schemas.microsoft.com/office/drawing/2014/main" id="{14E5B637-EFB1-485A-93FD-B96132C74F77}"/>
-              </a:ext>
-            </a:extLst>
-          </p:cNvPr>
-          <p:cNvSpPr>
-            <a:spLocks noGrp="1"/>
-          </p:cNvSpPr>
-          <p:nvPr>
-            <p:ph type="title"/>
-          </p:nvPr>
-        </p:nvSpPr>
-        <p:spPr/>
-        <p:txBody>
-          <a:bodyPr/>
-          <a:lstStyle/>
-          <a:p>
-            <a:r>
-              <a:rPr lang="nb-NO" dirty="0">
-                <a:solidFill>
-                  <a:schemeClr val="tx1"/>
-                </a:solidFill>
-              </a:rPr>
-              <a:t>Folder </a:t>
-            </a:r>
-            <a:r>
-              <a:rPr lang="nb-NO" dirty="0" err="1">
-                <a:solidFill>
-                  <a:schemeClr val="tx1"/>
-                </a:solidFill>
-              </a:rPr>
-              <a:t>structure</a:t>
-            </a:r>
-            <a:endParaRPr lang="en-GB" dirty="0">
-              <a:solidFill>
-                <a:schemeClr val="tx1"/>
-              </a:solidFill>
-            </a:endParaRPr>
-          </a:p>
-        </p:txBody>
-      </p:sp>
-      <p:sp>
-        <p:nvSpPr>
-          <p:cNvPr id="3" name="Content Placeholder 2">
-            <a:extLst>
-              <a:ext uri="{FF2B5EF4-FFF2-40B4-BE49-F238E27FC236}">
-                <a16:creationId xmlns:a16="http://schemas.microsoft.com/office/drawing/2014/main" id="{970C01B7-A266-4D0B-9A43-EEEEC42279A0}"/>
-              </a:ext>
-            </a:extLst>
-          </p:cNvPr>
-          <p:cNvSpPr>
-            <a:spLocks noGrp="1"/>
-          </p:cNvSpPr>
-          <p:nvPr>
-            <p:ph idx="1"/>
-          </p:nvPr>
-        </p:nvSpPr>
-        <p:spPr/>
-        <p:txBody>
-          <a:bodyPr/>
-          <a:lstStyle/>
-          <a:p>
-            <a:r>
-              <a:rPr lang="nb-NO" dirty="0" err="1"/>
-              <a:t>Tree</a:t>
-            </a:r>
-            <a:r>
-              <a:rPr lang="nb-NO" dirty="0"/>
-              <a:t> letters </a:t>
-            </a:r>
-            <a:r>
-              <a:rPr lang="nb-NO" dirty="0" err="1"/>
-              <a:t>denoting</a:t>
-            </a:r>
-            <a:r>
-              <a:rPr lang="nb-NO" dirty="0"/>
-              <a:t> </a:t>
-            </a:r>
-            <a:r>
-              <a:rPr lang="nb-NO" b="1" dirty="0" err="1"/>
-              <a:t>group</a:t>
-            </a:r>
-            <a:r>
-              <a:rPr lang="nb-NO" b="1" dirty="0"/>
-              <a:t> </a:t>
-            </a:r>
-            <a:r>
-              <a:rPr lang="nb-NO" b="1" dirty="0" err="1"/>
-              <a:t>name</a:t>
-            </a:r>
-            <a:endParaRPr lang="nb-NO" b="1" dirty="0"/>
-          </a:p>
-          <a:p>
-            <a:r>
-              <a:rPr lang="nb-NO" dirty="0"/>
-              <a:t>Total 26^3 = 17 576 combinations</a:t>
-            </a:r>
-          </a:p>
-          <a:p>
-            <a:endParaRPr lang="nb-NO" dirty="0"/>
-          </a:p>
-          <a:p>
-            <a:r>
-              <a:rPr lang="nb-NO" dirty="0"/>
-              <a:t>Models </a:t>
-            </a:r>
-            <a:r>
-              <a:rPr lang="nb-NO" dirty="0" err="1"/>
-              <a:t>are</a:t>
-            </a:r>
-            <a:r>
-              <a:rPr lang="nb-NO" dirty="0"/>
-              <a:t> given a </a:t>
-            </a:r>
-            <a:r>
-              <a:rPr lang="nb-NO" dirty="0" err="1"/>
-              <a:t>number</a:t>
-            </a:r>
-            <a:r>
-              <a:rPr lang="nb-NO" dirty="0"/>
-              <a:t> </a:t>
-            </a:r>
-            <a:r>
-              <a:rPr lang="nb-NO" dirty="0" err="1"/>
-              <a:t>starting</a:t>
-            </a:r>
-            <a:r>
-              <a:rPr lang="nb-NO" dirty="0"/>
-              <a:t> at 0</a:t>
-            </a:r>
-          </a:p>
-          <a:p>
-            <a:endParaRPr lang="nb-NO" dirty="0"/>
-          </a:p>
-          <a:p>
-            <a:r>
-              <a:rPr lang="nb-NO" dirty="0"/>
-              <a:t>A </a:t>
-            </a:r>
-            <a:r>
-              <a:rPr lang="nb-NO" dirty="0" err="1"/>
-              <a:t>model</a:t>
-            </a:r>
-            <a:r>
-              <a:rPr lang="nb-NO" dirty="0"/>
-              <a:t> </a:t>
-            </a:r>
-            <a:r>
-              <a:rPr lang="nb-NO" dirty="0" err="1"/>
-              <a:t>name</a:t>
-            </a:r>
-            <a:r>
-              <a:rPr lang="nb-NO" dirty="0"/>
-              <a:t> </a:t>
-            </a:r>
-            <a:r>
-              <a:rPr lang="nb-NO" dirty="0" err="1"/>
-              <a:t>will</a:t>
-            </a:r>
-            <a:r>
-              <a:rPr lang="nb-NO" dirty="0"/>
-              <a:t> </a:t>
-            </a:r>
-            <a:r>
-              <a:rPr lang="nb-NO" dirty="0" err="1"/>
-              <a:t>then</a:t>
-            </a:r>
-            <a:r>
-              <a:rPr lang="nb-NO" dirty="0"/>
-              <a:t> be </a:t>
-            </a:r>
-            <a:r>
-              <a:rPr lang="nb-NO" dirty="0" err="1"/>
-              <a:t>Groupname</a:t>
-            </a:r>
-            <a:r>
-              <a:rPr lang="nb-NO" dirty="0"/>
-              <a:t> / </a:t>
-            </a:r>
-            <a:r>
-              <a:rPr lang="nb-NO" dirty="0" err="1"/>
-              <a:t>Modelnumber</a:t>
-            </a:r>
-            <a:endParaRPr lang="en-GB" dirty="0"/>
-          </a:p>
-        </p:txBody>
-      </p:sp>
-      <p:pic>
-        <p:nvPicPr>
-          <p:cNvPr id="9" name="Picture 8">
-            <a:extLst>
-              <a:ext uri="{FF2B5EF4-FFF2-40B4-BE49-F238E27FC236}">
-                <a16:creationId xmlns:a16="http://schemas.microsoft.com/office/drawing/2014/main" id="{1446C5D3-5B1A-481D-A554-0D46DC8EF574}"/>
-              </a:ext>
-            </a:extLst>
-          </p:cNvPr>
-          <p:cNvPicPr>
-            <a:picLocks noChangeAspect="1"/>
-          </p:cNvPicPr>
-          <p:nvPr/>
-        </p:nvPicPr>
-        <p:blipFill>
-          <a:blip r:embed="rId2"/>
-          <a:stretch>
-            <a:fillRect/>
-          </a:stretch>
-        </p:blipFill>
-        <p:spPr>
-          <a:xfrm>
-            <a:off x="8236491" y="1852612"/>
-            <a:ext cx="3695700" cy="3152775"/>
-          </a:xfrm>
-          <a:prstGeom prst="rect">
-            <a:avLst/>
-          </a:prstGeom>
-        </p:spPr>
-      </p:pic>
-    </p:spTree>
-    <p:extLst>
-      <p:ext uri="{BB962C8B-B14F-4D97-AF65-F5344CB8AC3E}">
-        <p14:creationId xmlns:p14="http://schemas.microsoft.com/office/powerpoint/2010/main" val="873877308"/>
-      </p:ext>
-    </p:extLst>
-  </p:cSld>
-  <p:clrMapOvr>
-    <a:masterClrMapping/>
-  </p:clrMapOvr>
-</p:sld>
-</file>
-
-<file path=ppt/slides/slide5.xml><?xml version="1.0" encoding="utf-8"?>
-<p:sld xmlns:a="http://schemas.openxmlformats.org/drawingml/2006/main" xmlns:r="http://schemas.openxmlformats.org/officeDocument/2006/relationships" xmlns:p="http://schemas.openxmlformats.org/presentationml/2006/main">
-  <p:cSld>
-    <p:spTree>
-      <p:nvGrpSpPr>
-        <p:cNvPr id="1" name=""/>
-        <p:cNvGrpSpPr/>
-        <p:nvPr/>
-      </p:nvGrpSpPr>
-      <p:grpSpPr>
-        <a:xfrm>
-          <a:off x="0" y="0"/>
-          <a:ext cx="0" cy="0"/>
-          <a:chOff x="0" y="0"/>
-          <a:chExt cx="0" cy="0"/>
-        </a:xfrm>
-      </p:grpSpPr>
-      <p:sp>
-        <p:nvSpPr>
-          <p:cNvPr id="2" name="Title 1">
-            <a:extLst>
-              <a:ext uri="{FF2B5EF4-FFF2-40B4-BE49-F238E27FC236}">
-                <a16:creationId xmlns:a16="http://schemas.microsoft.com/office/drawing/2014/main" id="{D49D0B6E-3D07-4C7C-99BB-FE4BA517C483}"/>
-              </a:ext>
-            </a:extLst>
-          </p:cNvPr>
-          <p:cNvSpPr>
-            <a:spLocks noGrp="1"/>
-          </p:cNvSpPr>
-          <p:nvPr>
-            <p:ph type="title"/>
-          </p:nvPr>
-        </p:nvSpPr>
-        <p:spPr/>
-        <p:txBody>
-          <a:bodyPr/>
-          <a:lstStyle/>
-          <a:p>
-            <a:r>
-              <a:rPr lang="nb-NO" dirty="0">
-                <a:solidFill>
-                  <a:schemeClr val="tx1"/>
-                </a:solidFill>
-              </a:rPr>
-              <a:t>Model </a:t>
-            </a:r>
-            <a:r>
-              <a:rPr lang="nb-NO" dirty="0" err="1">
-                <a:solidFill>
-                  <a:schemeClr val="tx1"/>
-                </a:solidFill>
-              </a:rPr>
-              <a:t>configs</a:t>
-            </a:r>
-            <a:endParaRPr lang="en-GB" dirty="0">
-              <a:solidFill>
-                <a:schemeClr val="tx1"/>
-              </a:solidFill>
-            </a:endParaRPr>
-          </a:p>
-        </p:txBody>
-      </p:sp>
-      <p:sp>
-        <p:nvSpPr>
-          <p:cNvPr id="3" name="Content Placeholder 2">
-            <a:extLst>
-              <a:ext uri="{FF2B5EF4-FFF2-40B4-BE49-F238E27FC236}">
-                <a16:creationId xmlns:a16="http://schemas.microsoft.com/office/drawing/2014/main" id="{3FA04A3F-FAD4-4221-B898-49AA0B68DF18}"/>
-              </a:ext>
-            </a:extLst>
-          </p:cNvPr>
-          <p:cNvSpPr>
-            <a:spLocks noGrp="1"/>
-          </p:cNvSpPr>
-          <p:nvPr>
-            <p:ph idx="1"/>
-          </p:nvPr>
-        </p:nvSpPr>
-        <p:spPr>
-          <a:xfrm>
-            <a:off x="676656" y="2011680"/>
-            <a:ext cx="5743599" cy="3766185"/>
-          </a:xfrm>
-        </p:spPr>
-        <p:txBody>
-          <a:bodyPr>
-            <a:normAutofit lnSpcReduction="10000"/>
-          </a:bodyPr>
-          <a:lstStyle/>
-          <a:p>
-            <a:r>
-              <a:rPr lang="nb-NO" dirty="0" err="1"/>
-              <a:t>These</a:t>
-            </a:r>
-            <a:r>
-              <a:rPr lang="nb-NO" dirty="0"/>
-              <a:t> </a:t>
-            </a:r>
-            <a:r>
-              <a:rPr lang="nb-NO" dirty="0" err="1"/>
-              <a:t>are</a:t>
-            </a:r>
-            <a:r>
-              <a:rPr lang="nb-NO" dirty="0"/>
-              <a:t> </a:t>
-            </a:r>
-            <a:r>
-              <a:rPr lang="nb-NO" dirty="0" err="1"/>
-              <a:t>saved</a:t>
-            </a:r>
-            <a:r>
-              <a:rPr lang="nb-NO" dirty="0"/>
-              <a:t> in </a:t>
-            </a:r>
-            <a:r>
-              <a:rPr lang="nb-NO" dirty="0" err="1"/>
-              <a:t>the</a:t>
-            </a:r>
-            <a:r>
-              <a:rPr lang="nb-NO" dirty="0"/>
-              <a:t> .</a:t>
-            </a:r>
-            <a:r>
-              <a:rPr lang="nb-NO" dirty="0" err="1"/>
-              <a:t>json</a:t>
-            </a:r>
-            <a:r>
-              <a:rPr lang="nb-NO" dirty="0"/>
-              <a:t> file</a:t>
-            </a:r>
-          </a:p>
-          <a:p>
-            <a:endParaRPr lang="nb-NO" dirty="0"/>
-          </a:p>
-          <a:p>
-            <a:r>
-              <a:rPr lang="nb-NO" dirty="0" err="1"/>
-              <a:t>These</a:t>
-            </a:r>
-            <a:r>
-              <a:rPr lang="nb-NO" dirty="0"/>
-              <a:t> parameters </a:t>
-            </a:r>
-            <a:r>
-              <a:rPr lang="nb-NO" dirty="0" err="1"/>
-              <a:t>get</a:t>
-            </a:r>
-            <a:r>
-              <a:rPr lang="nb-NO" dirty="0"/>
-              <a:t> </a:t>
-            </a:r>
-            <a:r>
-              <a:rPr lang="nb-NO" dirty="0" err="1"/>
-              <a:t>tweaked</a:t>
-            </a:r>
-            <a:r>
-              <a:rPr lang="nb-NO" dirty="0"/>
-              <a:t> by </a:t>
-            </a:r>
-            <a:r>
-              <a:rPr lang="nb-NO" dirty="0" err="1"/>
-              <a:t>optuna</a:t>
-            </a:r>
-            <a:r>
-              <a:rPr lang="nb-NO" dirty="0"/>
-              <a:t>, so I save </a:t>
-            </a:r>
-            <a:r>
-              <a:rPr lang="nb-NO" dirty="0" err="1"/>
-              <a:t>them</a:t>
-            </a:r>
-            <a:r>
-              <a:rPr lang="nb-NO" dirty="0"/>
-              <a:t> to be </a:t>
-            </a:r>
-            <a:r>
-              <a:rPr lang="nb-NO" dirty="0" err="1"/>
-              <a:t>able</a:t>
-            </a:r>
-            <a:r>
-              <a:rPr lang="nb-NO" dirty="0"/>
-              <a:t> to </a:t>
-            </a:r>
-            <a:r>
-              <a:rPr lang="nb-NO" dirty="0" err="1"/>
-              <a:t>compare</a:t>
-            </a:r>
-            <a:r>
-              <a:rPr lang="nb-NO" dirty="0"/>
-              <a:t> </a:t>
-            </a:r>
-            <a:r>
-              <a:rPr lang="nb-NO" dirty="0" err="1"/>
-              <a:t>what</a:t>
-            </a:r>
-            <a:r>
-              <a:rPr lang="nb-NO" dirty="0"/>
-              <a:t> </a:t>
-            </a:r>
-            <a:r>
-              <a:rPr lang="nb-NO" dirty="0" err="1"/>
-              <a:t>the</a:t>
-            </a:r>
-            <a:r>
-              <a:rPr lang="nb-NO" dirty="0"/>
-              <a:t> </a:t>
-            </a:r>
-            <a:r>
-              <a:rPr lang="nb-NO" dirty="0" err="1"/>
-              <a:t>good</a:t>
-            </a:r>
-            <a:r>
-              <a:rPr lang="nb-NO" dirty="0"/>
-              <a:t> </a:t>
-            </a:r>
-            <a:r>
-              <a:rPr lang="nb-NO" dirty="0" err="1"/>
-              <a:t>performing</a:t>
-            </a:r>
-            <a:r>
-              <a:rPr lang="nb-NO" dirty="0"/>
-              <a:t> </a:t>
-            </a:r>
-            <a:r>
-              <a:rPr lang="nb-NO" dirty="0" err="1"/>
-              <a:t>models</a:t>
-            </a:r>
-            <a:r>
-              <a:rPr lang="nb-NO" dirty="0"/>
-              <a:t> have in </a:t>
-            </a:r>
-            <a:r>
-              <a:rPr lang="nb-NO" dirty="0" err="1"/>
-              <a:t>common</a:t>
-            </a:r>
-            <a:endParaRPr lang="nb-NO" dirty="0"/>
-          </a:p>
-          <a:p>
-            <a:endParaRPr lang="nb-NO" dirty="0"/>
-          </a:p>
-          <a:p>
-            <a:r>
-              <a:rPr lang="nb-NO" dirty="0"/>
-              <a:t>Planning to </a:t>
-            </a:r>
-            <a:r>
-              <a:rPr lang="nb-NO" dirty="0" err="1"/>
-              <a:t>add</a:t>
-            </a:r>
-            <a:r>
-              <a:rPr lang="nb-NO" dirty="0"/>
-              <a:t> ‘</a:t>
-            </a:r>
-            <a:r>
-              <a:rPr lang="nb-NO" dirty="0" err="1"/>
-              <a:t>feat_aug_dataset</a:t>
-            </a:r>
-            <a:r>
-              <a:rPr lang="nb-NO" dirty="0"/>
-              <a:t>’ to have </a:t>
-            </a:r>
-            <a:r>
-              <a:rPr lang="nb-NO" dirty="0" err="1"/>
-              <a:t>optuna</a:t>
-            </a:r>
-            <a:r>
-              <a:rPr lang="nb-NO" dirty="0"/>
-              <a:t> </a:t>
-            </a:r>
-            <a:r>
-              <a:rPr lang="nb-NO" dirty="0" err="1"/>
-              <a:t>decide</a:t>
-            </a:r>
-            <a:r>
-              <a:rPr lang="nb-NO" dirty="0"/>
-              <a:t> </a:t>
-            </a:r>
-            <a:r>
-              <a:rPr lang="nb-NO" dirty="0" err="1"/>
-              <a:t>what</a:t>
-            </a:r>
-            <a:r>
-              <a:rPr lang="nb-NO" dirty="0"/>
-              <a:t> </a:t>
-            </a:r>
-            <a:r>
-              <a:rPr lang="nb-NO" dirty="0" err="1"/>
-              <a:t>additional</a:t>
-            </a:r>
-            <a:r>
-              <a:rPr lang="nb-NO" dirty="0"/>
-              <a:t> data </a:t>
-            </a:r>
-            <a:r>
-              <a:rPr lang="nb-NO" dirty="0" err="1"/>
-              <a:t>preprocessing</a:t>
-            </a:r>
-            <a:r>
-              <a:rPr lang="nb-NO" dirty="0"/>
-              <a:t> is </a:t>
-            </a:r>
-            <a:r>
-              <a:rPr lang="nb-NO" dirty="0" err="1"/>
-              <a:t>preferable</a:t>
-            </a:r>
-            <a:endParaRPr lang="en-GB" dirty="0"/>
-          </a:p>
-        </p:txBody>
-      </p:sp>
-      <p:pic>
-        <p:nvPicPr>
-          <p:cNvPr id="5" name="Picture 4">
-            <a:extLst>
-              <a:ext uri="{FF2B5EF4-FFF2-40B4-BE49-F238E27FC236}">
-                <a16:creationId xmlns:a16="http://schemas.microsoft.com/office/drawing/2014/main" id="{81C685BA-F863-43CF-9939-1BC0386BC08A}"/>
-              </a:ext>
-            </a:extLst>
-          </p:cNvPr>
-          <p:cNvPicPr>
-            <a:picLocks noChangeAspect="1"/>
-          </p:cNvPicPr>
-          <p:nvPr/>
-        </p:nvPicPr>
-        <p:blipFill>
-          <a:blip r:embed="rId2"/>
-          <a:stretch>
-            <a:fillRect/>
-          </a:stretch>
-        </p:blipFill>
-        <p:spPr>
-          <a:xfrm>
-            <a:off x="7135542" y="1453515"/>
-            <a:ext cx="3990975" cy="4324350"/>
-          </a:xfrm>
-          <a:prstGeom prst="rect">
-            <a:avLst/>
-          </a:prstGeom>
-        </p:spPr>
-      </p:pic>
-    </p:spTree>
-    <p:extLst>
-      <p:ext uri="{BB962C8B-B14F-4D97-AF65-F5344CB8AC3E}">
-        <p14:creationId xmlns:p14="http://schemas.microsoft.com/office/powerpoint/2010/main" val="3208444305"/>
-      </p:ext>
-    </p:extLst>
-  </p:cSld>
-  <p:clrMapOvr>
-    <a:masterClrMapping/>
-  </p:clrMapOvr>
-</p:sld>
-</file>
-
-<file path=ppt/slides/slide6.xml><?xml version="1.0" encoding="utf-8"?>
-<p:sld xmlns:a="http://schemas.openxmlformats.org/drawingml/2006/main" xmlns:r="http://schemas.openxmlformats.org/officeDocument/2006/relationships" xmlns:p="http://schemas.openxmlformats.org/presentationml/2006/main">
-  <p:cSld>
-    <p:spTree>
-      <p:nvGrpSpPr>
-        <p:cNvPr id="1" name=""/>
-        <p:cNvGrpSpPr/>
-        <p:nvPr/>
-      </p:nvGrpSpPr>
-      <p:grpSpPr>
-        <a:xfrm>
-          <a:off x="0" y="0"/>
-          <a:ext cx="0" cy="0"/>
-          <a:chOff x="0" y="0"/>
-          <a:chExt cx="0" cy="0"/>
-        </a:xfrm>
-      </p:grpSpPr>
-      <p:sp>
-        <p:nvSpPr>
-          <p:cNvPr id="2" name="Title 1">
-            <a:extLst>
-              <a:ext uri="{FF2B5EF4-FFF2-40B4-BE49-F238E27FC236}">
-                <a16:creationId xmlns:a16="http://schemas.microsoft.com/office/drawing/2014/main" id="{627BF425-BA66-4C92-93AF-D351F8D6410E}"/>
-              </a:ext>
-            </a:extLst>
-          </p:cNvPr>
-          <p:cNvSpPr>
-            <a:spLocks noGrp="1"/>
-          </p:cNvSpPr>
-          <p:nvPr>
-            <p:ph type="title"/>
-          </p:nvPr>
-        </p:nvSpPr>
-        <p:spPr/>
-        <p:txBody>
-          <a:bodyPr/>
-          <a:lstStyle/>
-          <a:p>
-            <a:r>
-              <a:rPr lang="nb-NO" dirty="0" err="1">
-                <a:solidFill>
-                  <a:schemeClr val="tx1"/>
-                </a:solidFill>
-              </a:rPr>
-              <a:t>Reconstruction</a:t>
-            </a:r>
-            <a:endParaRPr lang="en-GB" dirty="0">
-              <a:solidFill>
-                <a:schemeClr val="tx1"/>
-              </a:solidFill>
-            </a:endParaRPr>
-          </a:p>
-        </p:txBody>
-      </p:sp>
-      <p:pic>
-        <p:nvPicPr>
-          <p:cNvPr id="5" name="Content Placeholder 4" descr="A picture containing blue&#10;&#10;Description automatically generated">
-            <a:extLst>
-              <a:ext uri="{FF2B5EF4-FFF2-40B4-BE49-F238E27FC236}">
-                <a16:creationId xmlns:a16="http://schemas.microsoft.com/office/drawing/2014/main" id="{154A3C1F-4C64-47CA-80FF-4E89DDA7845F}"/>
-              </a:ext>
-            </a:extLst>
-          </p:cNvPr>
-          <p:cNvPicPr>
-            <a:picLocks noGrp="1" noChangeAspect="1"/>
-          </p:cNvPicPr>
-          <p:nvPr>
-            <p:ph idx="1"/>
-          </p:nvPr>
-        </p:nvPicPr>
-        <p:blipFill>
-          <a:blip r:embed="rId2">
-            <a:extLst>
-              <a:ext uri="{28A0092B-C50C-407E-A947-70E740481C1C}">
-                <a14:useLocalDpi xmlns:a14="http://schemas.microsoft.com/office/drawing/2010/main" val="0"/>
-              </a:ext>
-            </a:extLst>
-          </a:blip>
-          <a:stretch>
-            <a:fillRect/>
-          </a:stretch>
-        </p:blipFill>
-        <p:spPr>
-          <a:xfrm>
-            <a:off x="1211296" y="2314964"/>
-            <a:ext cx="4438650" cy="3333750"/>
-          </a:xfrm>
-        </p:spPr>
-      </p:pic>
-      <p:pic>
-        <p:nvPicPr>
-          <p:cNvPr id="7" name="Picture 6" descr="A picture containing blue, painted, fabric&#10;&#10;Description automatically generated">
-            <a:extLst>
-              <a:ext uri="{FF2B5EF4-FFF2-40B4-BE49-F238E27FC236}">
-                <a16:creationId xmlns:a16="http://schemas.microsoft.com/office/drawing/2014/main" id="{73A19980-46F4-458B-BF53-91409671D19F}"/>
-              </a:ext>
-            </a:extLst>
-          </p:cNvPr>
-          <p:cNvPicPr>
-            <a:picLocks noChangeAspect="1"/>
-          </p:cNvPicPr>
-          <p:nvPr/>
-        </p:nvPicPr>
-        <p:blipFill>
-          <a:blip r:embed="rId3">
-            <a:extLst>
-              <a:ext uri="{28A0092B-C50C-407E-A947-70E740481C1C}">
-                <a14:useLocalDpi xmlns:a14="http://schemas.microsoft.com/office/drawing/2010/main" val="0"/>
-              </a:ext>
-            </a:extLst>
-          </a:blip>
-          <a:stretch>
-            <a:fillRect/>
-          </a:stretch>
-        </p:blipFill>
-        <p:spPr>
-          <a:xfrm>
-            <a:off x="6405867" y="2314964"/>
-            <a:ext cx="4438650" cy="3333750"/>
-          </a:xfrm>
-          <a:prstGeom prst="rect">
-            <a:avLst/>
-          </a:prstGeom>
-        </p:spPr>
-      </p:pic>
-    </p:spTree>
-    <p:extLst>
-      <p:ext uri="{BB962C8B-B14F-4D97-AF65-F5344CB8AC3E}">
-        <p14:creationId xmlns:p14="http://schemas.microsoft.com/office/powerpoint/2010/main" val="218628252"/>
-      </p:ext>
-    </p:extLst>
-  </p:cSld>
-  <p:clrMapOvr>
-    <a:masterClrMapping/>
-  </p:clrMapOvr>
-</p:sld>
-</file>
-
-<file path=ppt/slides/slide7.xml><?xml version="1.0" encoding="utf-8"?>
-<p:sld xmlns:a="http://schemas.openxmlformats.org/drawingml/2006/main" xmlns:r="http://schemas.openxmlformats.org/officeDocument/2006/relationships" xmlns:p="http://schemas.openxmlformats.org/presentationml/2006/main">
-  <p:cSld>
-    <p:spTree>
-      <p:nvGrpSpPr>
-        <p:cNvPr id="1" name=""/>
-        <p:cNvGrpSpPr/>
-        <p:nvPr/>
-      </p:nvGrpSpPr>
-      <p:grpSpPr>
-        <a:xfrm>
-          <a:off x="0" y="0"/>
-          <a:ext cx="0" cy="0"/>
-          <a:chOff x="0" y="0"/>
-          <a:chExt cx="0" cy="0"/>
-        </a:xfrm>
-      </p:grpSpPr>
-      <p:sp>
-        <p:nvSpPr>
-          <p:cNvPr id="2" name="Title 1">
-            <a:extLst>
-              <a:ext uri="{FF2B5EF4-FFF2-40B4-BE49-F238E27FC236}">
-                <a16:creationId xmlns:a16="http://schemas.microsoft.com/office/drawing/2014/main" id="{03B84BDC-68B3-487A-916F-19C1B1BCE58F}"/>
-              </a:ext>
-            </a:extLst>
-          </p:cNvPr>
-          <p:cNvSpPr>
-            <a:spLocks noGrp="1"/>
-          </p:cNvSpPr>
-          <p:nvPr>
-            <p:ph type="title"/>
-          </p:nvPr>
-        </p:nvSpPr>
-        <p:spPr/>
-        <p:txBody>
-          <a:bodyPr>
-            <a:normAutofit/>
-          </a:bodyPr>
-          <a:lstStyle/>
-          <a:p>
-            <a:r>
-              <a:rPr lang="nb-NO" sz="4800" dirty="0">
-                <a:solidFill>
-                  <a:schemeClr val="tx1"/>
-                </a:solidFill>
-              </a:rPr>
-              <a:t>Not just a </a:t>
-            </a:r>
-            <a:r>
-              <a:rPr lang="nb-NO" sz="4800" dirty="0" err="1">
-                <a:solidFill>
-                  <a:schemeClr val="tx1"/>
-                </a:solidFill>
-              </a:rPr>
-              <a:t>kernel</a:t>
-            </a:r>
-            <a:r>
-              <a:rPr lang="nb-NO" sz="4800" dirty="0">
-                <a:solidFill>
-                  <a:schemeClr val="tx1"/>
-                </a:solidFill>
-              </a:rPr>
-              <a:t> </a:t>
-            </a:r>
-            <a:r>
-              <a:rPr lang="nb-NO" sz="4800" dirty="0" err="1">
-                <a:solidFill>
-                  <a:schemeClr val="tx1"/>
-                </a:solidFill>
-              </a:rPr>
-              <a:t>size</a:t>
-            </a:r>
-            <a:r>
-              <a:rPr lang="nb-NO" sz="4800" dirty="0">
-                <a:solidFill>
-                  <a:schemeClr val="tx1"/>
-                </a:solidFill>
-              </a:rPr>
-              <a:t> </a:t>
-            </a:r>
-            <a:r>
-              <a:rPr lang="nb-NO" sz="4800" dirty="0" err="1">
-                <a:solidFill>
-                  <a:schemeClr val="tx1"/>
-                </a:solidFill>
-              </a:rPr>
-              <a:t>issue</a:t>
-            </a:r>
-            <a:r>
-              <a:rPr lang="nb-NO" sz="4800" dirty="0">
-                <a:solidFill>
-                  <a:schemeClr val="tx1"/>
-                </a:solidFill>
-              </a:rPr>
-              <a:t> (</a:t>
-            </a:r>
-            <a:r>
-              <a:rPr lang="nb-NO" sz="4800" dirty="0" err="1">
-                <a:solidFill>
-                  <a:schemeClr val="tx1"/>
-                </a:solidFill>
-              </a:rPr>
-              <a:t>these</a:t>
-            </a:r>
-            <a:r>
-              <a:rPr lang="nb-NO" sz="4800" dirty="0">
-                <a:solidFill>
-                  <a:schemeClr val="tx1"/>
-                </a:solidFill>
-              </a:rPr>
-              <a:t> </a:t>
-            </a:r>
-            <a:r>
-              <a:rPr lang="nb-NO" sz="4800" dirty="0" err="1">
-                <a:solidFill>
-                  <a:schemeClr val="tx1"/>
-                </a:solidFill>
-              </a:rPr>
-              <a:t>had</a:t>
-            </a:r>
-            <a:r>
-              <a:rPr lang="nb-NO" sz="4800" dirty="0">
-                <a:solidFill>
-                  <a:schemeClr val="tx1"/>
-                </a:solidFill>
-              </a:rPr>
-              <a:t> </a:t>
-            </a:r>
-            <a:r>
-              <a:rPr lang="nb-NO" sz="4800" dirty="0" err="1">
-                <a:solidFill>
-                  <a:schemeClr val="tx1"/>
-                </a:solidFill>
-              </a:rPr>
-              <a:t>ks</a:t>
-            </a:r>
-            <a:r>
-              <a:rPr lang="nb-NO" sz="4800" dirty="0">
-                <a:solidFill>
-                  <a:schemeClr val="tx1"/>
-                </a:solidFill>
-              </a:rPr>
-              <a:t>=8)</a:t>
-            </a:r>
-            <a:endParaRPr lang="en-GB" sz="4800" dirty="0">
-              <a:solidFill>
-                <a:schemeClr val="tx1"/>
-              </a:solidFill>
-            </a:endParaRPr>
-          </a:p>
-        </p:txBody>
-      </p:sp>
-      <p:pic>
-        <p:nvPicPr>
-          <p:cNvPr id="5" name="Content Placeholder 4" descr="A picture containing text, screenshot&#10;&#10;Description automatically generated">
-            <a:extLst>
-              <a:ext uri="{FF2B5EF4-FFF2-40B4-BE49-F238E27FC236}">
-                <a16:creationId xmlns:a16="http://schemas.microsoft.com/office/drawing/2014/main" id="{F589CBC7-A990-43CA-8981-59B32C742CFF}"/>
-              </a:ext>
-            </a:extLst>
-          </p:cNvPr>
-          <p:cNvPicPr>
-            <a:picLocks noGrp="1" noChangeAspect="1"/>
-          </p:cNvPicPr>
-          <p:nvPr>
-            <p:ph idx="1"/>
-          </p:nvPr>
-        </p:nvPicPr>
-        <p:blipFill>
-          <a:blip r:embed="rId2">
-            <a:extLst>
-              <a:ext uri="{28A0092B-C50C-407E-A947-70E740481C1C}">
-                <a14:useLocalDpi xmlns:a14="http://schemas.microsoft.com/office/drawing/2010/main" val="0"/>
-              </a:ext>
-            </a:extLst>
-          </a:blip>
-          <a:stretch>
-            <a:fillRect/>
-          </a:stretch>
-        </p:blipFill>
-        <p:spPr>
-          <a:xfrm>
-            <a:off x="1182113" y="1888585"/>
-            <a:ext cx="4438650" cy="3333750"/>
-          </a:xfrm>
-        </p:spPr>
-      </p:pic>
-      <p:pic>
-        <p:nvPicPr>
-          <p:cNvPr id="7" name="Picture 6" descr="A picture containing text, screenshot&#10;&#10;Description automatically generated">
-            <a:extLst>
-              <a:ext uri="{FF2B5EF4-FFF2-40B4-BE49-F238E27FC236}">
-                <a16:creationId xmlns:a16="http://schemas.microsoft.com/office/drawing/2014/main" id="{457D4CC2-021B-4A7F-B3FE-B1389F3A333B}"/>
-              </a:ext>
-            </a:extLst>
-          </p:cNvPr>
-          <p:cNvPicPr>
-            <a:picLocks noChangeAspect="1"/>
-          </p:cNvPicPr>
-          <p:nvPr/>
-        </p:nvPicPr>
-        <p:blipFill>
-          <a:blip r:embed="rId3">
-            <a:extLst>
-              <a:ext uri="{28A0092B-C50C-407E-A947-70E740481C1C}">
-                <a14:useLocalDpi xmlns:a14="http://schemas.microsoft.com/office/drawing/2010/main" val="0"/>
-              </a:ext>
-            </a:extLst>
-          </a:blip>
-          <a:stretch>
-            <a:fillRect/>
-          </a:stretch>
-        </p:blipFill>
-        <p:spPr>
-          <a:xfrm>
-            <a:off x="6483687" y="1888585"/>
-            <a:ext cx="4438650" cy="3333750"/>
-          </a:xfrm>
-          <a:prstGeom prst="rect">
-            <a:avLst/>
-          </a:prstGeom>
-        </p:spPr>
-      </p:pic>
-    </p:spTree>
-    <p:extLst>
-      <p:ext uri="{BB962C8B-B14F-4D97-AF65-F5344CB8AC3E}">
-        <p14:creationId xmlns:p14="http://schemas.microsoft.com/office/powerpoint/2010/main" val="2778917961"/>
-      </p:ext>
-    </p:extLst>
-  </p:cSld>
-  <p:clrMapOvr>
-    <a:masterClrMapping/>
-  </p:clrMapOvr>
-</p:sld>
-</file>
-
-<file path=ppt/slides/slide8.xml><?xml version="1.0" encoding="utf-8"?>
-<p:sld xmlns:a="http://schemas.openxmlformats.org/drawingml/2006/main" xmlns:r="http://schemas.openxmlformats.org/officeDocument/2006/relationships" xmlns:p="http://schemas.openxmlformats.org/presentationml/2006/main">
-  <p:cSld>
-    <p:spTree>
-      <p:nvGrpSpPr>
-        <p:cNvPr id="1" name=""/>
-        <p:cNvGrpSpPr/>
-        <p:nvPr/>
-      </p:nvGrpSpPr>
-      <p:grpSpPr>
-        <a:xfrm>
-          <a:off x="0" y="0"/>
-          <a:ext cx="0" cy="0"/>
-          <a:chOff x="0" y="0"/>
-          <a:chExt cx="0" cy="0"/>
-        </a:xfrm>
-      </p:grpSpPr>
-      <p:sp>
-        <p:nvSpPr>
-          <p:cNvPr id="2" name="Title 1">
-            <a:extLst>
-              <a:ext uri="{FF2B5EF4-FFF2-40B4-BE49-F238E27FC236}">
-                <a16:creationId xmlns:a16="http://schemas.microsoft.com/office/drawing/2014/main" id="{E36C5BE7-EB5D-407C-805E-ADE99408FFFB}"/>
-              </a:ext>
-            </a:extLst>
-          </p:cNvPr>
-          <p:cNvSpPr>
-            <a:spLocks noGrp="1"/>
-          </p:cNvSpPr>
-          <p:nvPr>
-            <p:ph type="title"/>
-          </p:nvPr>
-        </p:nvSpPr>
-        <p:spPr/>
-        <p:txBody>
-          <a:bodyPr>
-            <a:normAutofit/>
-          </a:bodyPr>
-          <a:lstStyle/>
-          <a:p>
-            <a:r>
-              <a:rPr lang="nb-NO" sz="4000" dirty="0" err="1">
-                <a:solidFill>
-                  <a:schemeClr val="tx1"/>
-                </a:solidFill>
-              </a:rPr>
-              <a:t>Errors</a:t>
-            </a:r>
-            <a:r>
-              <a:rPr lang="nb-NO" sz="4000" dirty="0">
-                <a:solidFill>
-                  <a:schemeClr val="tx1"/>
-                </a:solidFill>
-              </a:rPr>
-              <a:t> </a:t>
-            </a:r>
-            <a:r>
-              <a:rPr lang="nb-NO" sz="4000" dirty="0" err="1">
-                <a:solidFill>
-                  <a:schemeClr val="tx1"/>
-                </a:solidFill>
-              </a:rPr>
-              <a:t>might</a:t>
-            </a:r>
-            <a:r>
-              <a:rPr lang="nb-NO" sz="4000" dirty="0">
-                <a:solidFill>
-                  <a:schemeClr val="tx1"/>
-                </a:solidFill>
-              </a:rPr>
-              <a:t> just be bad regions </a:t>
-            </a:r>
-            <a:r>
-              <a:rPr lang="nb-NO" sz="4000" dirty="0" err="1">
-                <a:solidFill>
-                  <a:schemeClr val="tx1"/>
-                </a:solidFill>
-              </a:rPr>
-              <a:t>of</a:t>
-            </a:r>
-            <a:r>
-              <a:rPr lang="nb-NO" sz="4000" dirty="0">
-                <a:solidFill>
-                  <a:schemeClr val="tx1"/>
-                </a:solidFill>
-              </a:rPr>
-              <a:t> loss landscape</a:t>
-            </a:r>
-            <a:endParaRPr lang="en-GB" sz="4000" dirty="0">
-              <a:solidFill>
-                <a:schemeClr val="tx1"/>
-              </a:solidFill>
-            </a:endParaRPr>
-          </a:p>
-        </p:txBody>
-      </p:sp>
-      <p:pic>
-        <p:nvPicPr>
-          <p:cNvPr id="5" name="Content Placeholder 4">
-            <a:extLst>
-              <a:ext uri="{FF2B5EF4-FFF2-40B4-BE49-F238E27FC236}">
-                <a16:creationId xmlns:a16="http://schemas.microsoft.com/office/drawing/2014/main" id="{3B89FBB7-DF56-48EC-8756-0059E7798100}"/>
-              </a:ext>
-            </a:extLst>
-          </p:cNvPr>
-          <p:cNvPicPr>
-            <a:picLocks noGrp="1" noChangeAspect="1"/>
-          </p:cNvPicPr>
-          <p:nvPr>
-            <p:ph idx="1"/>
-          </p:nvPr>
-        </p:nvPicPr>
-        <p:blipFill>
-          <a:blip r:embed="rId2"/>
-          <a:stretch>
-            <a:fillRect/>
-          </a:stretch>
-        </p:blipFill>
-        <p:spPr>
-          <a:xfrm>
-            <a:off x="1809750" y="2013744"/>
-            <a:ext cx="8486775" cy="3762375"/>
-          </a:xfrm>
-        </p:spPr>
-      </p:pic>
-    </p:spTree>
-    <p:extLst>
-      <p:ext uri="{BB962C8B-B14F-4D97-AF65-F5344CB8AC3E}">
-        <p14:creationId xmlns:p14="http://schemas.microsoft.com/office/powerpoint/2010/main" val="2971230527"/>
-      </p:ext>
-    </p:extLst>
-  </p:cSld>
-  <p:clrMapOvr>
-    <a:masterClrMapping/>
-  </p:clrMapOvr>
-</p:sld>
-</file>
-
-<file path=ppt/slides/slide9.xml><?xml version="1.0" encoding="utf-8"?>
+<file path=ppt/slides/slide10.xml><?xml version="1.0" encoding="utf-8"?>
 <p:sld xmlns:a="http://schemas.openxmlformats.org/drawingml/2006/main" xmlns:r="http://schemas.openxmlformats.org/officeDocument/2006/relationships" xmlns:p="http://schemas.openxmlformats.org/presentationml/2006/main">
   <p:cSld>
     <p:spTree>
@@ -5342,10 +3967,3229 @@
           </a:prstGeom>
         </p:spPr>
       </p:pic>
+      <p:sp>
+        <p:nvSpPr>
+          <p:cNvPr id="3" name="TextBox 2">
+            <a:extLst>
+              <a:ext uri="{FF2B5EF4-FFF2-40B4-BE49-F238E27FC236}">
+                <a16:creationId xmlns:a16="http://schemas.microsoft.com/office/drawing/2014/main" id="{6A0FA71E-F397-41CE-A834-63409068DB01}"/>
+              </a:ext>
+            </a:extLst>
+          </p:cNvPr>
+          <p:cNvSpPr txBox="1"/>
+          <p:nvPr/>
+        </p:nvSpPr>
+        <p:spPr>
+          <a:xfrm>
+            <a:off x="4737370" y="5525311"/>
+            <a:ext cx="5680953" cy="646331"/>
+          </a:xfrm>
+          <a:prstGeom prst="rect">
+            <a:avLst/>
+          </a:prstGeom>
+          <a:noFill/>
+        </p:spPr>
+        <p:txBody>
+          <a:bodyPr wrap="square" rtlCol="0">
+            <a:spAutoFit/>
+          </a:bodyPr>
+          <a:lstStyle/>
+          <a:p>
+            <a:r>
+              <a:rPr lang="nb-NO" dirty="0"/>
+              <a:t>This </a:t>
+            </a:r>
+            <a:r>
+              <a:rPr lang="nb-NO" dirty="0" err="1"/>
+              <a:t>means</a:t>
+            </a:r>
+            <a:r>
+              <a:rPr lang="nb-NO" dirty="0"/>
+              <a:t> </a:t>
+            </a:r>
+            <a:r>
+              <a:rPr lang="nb-NO" dirty="0" err="1"/>
+              <a:t>that</a:t>
+            </a:r>
+            <a:r>
+              <a:rPr lang="nb-NO" dirty="0"/>
+              <a:t> I </a:t>
+            </a:r>
+            <a:r>
+              <a:rPr lang="nb-NO" dirty="0" err="1"/>
+              <a:t>will</a:t>
+            </a:r>
+            <a:r>
+              <a:rPr lang="nb-NO" dirty="0"/>
+              <a:t> be </a:t>
+            </a:r>
+            <a:r>
+              <a:rPr lang="nb-NO" dirty="0" err="1"/>
+              <a:t>able</a:t>
+            </a:r>
+            <a:r>
+              <a:rPr lang="nb-NO" dirty="0"/>
+              <a:t> to </a:t>
+            </a:r>
+            <a:r>
+              <a:rPr lang="nb-NO" dirty="0" err="1"/>
+              <a:t>train</a:t>
+            </a:r>
+            <a:r>
+              <a:rPr lang="nb-NO" dirty="0"/>
+              <a:t> </a:t>
+            </a:r>
+            <a:r>
+              <a:rPr lang="nb-NO" b="1" dirty="0"/>
+              <a:t>10x</a:t>
+            </a:r>
+            <a:r>
+              <a:rPr lang="nb-NO" dirty="0"/>
+              <a:t> as </a:t>
+            </a:r>
+            <a:r>
+              <a:rPr lang="nb-NO" dirty="0" err="1"/>
+              <a:t>many</a:t>
+            </a:r>
+            <a:r>
+              <a:rPr lang="nb-NO" dirty="0"/>
+              <a:t> </a:t>
+            </a:r>
+            <a:r>
+              <a:rPr lang="nb-NO" dirty="0" err="1"/>
+              <a:t>models</a:t>
+            </a:r>
+            <a:r>
+              <a:rPr lang="nb-NO" dirty="0"/>
+              <a:t>, and </a:t>
+            </a:r>
+            <a:r>
+              <a:rPr lang="nb-NO" dirty="0" err="1"/>
+              <a:t>explore</a:t>
+            </a:r>
+            <a:r>
+              <a:rPr lang="nb-NO" dirty="0"/>
+              <a:t> a </a:t>
+            </a:r>
+            <a:r>
+              <a:rPr lang="nb-NO" dirty="0" err="1"/>
+              <a:t>larger</a:t>
+            </a:r>
+            <a:r>
+              <a:rPr lang="nb-NO" dirty="0"/>
+              <a:t> area </a:t>
+            </a:r>
+            <a:r>
+              <a:rPr lang="nb-NO" dirty="0" err="1"/>
+              <a:t>of</a:t>
+            </a:r>
+            <a:r>
+              <a:rPr lang="nb-NO" dirty="0"/>
+              <a:t> </a:t>
+            </a:r>
+            <a:r>
+              <a:rPr lang="nb-NO" dirty="0" err="1"/>
+              <a:t>the</a:t>
+            </a:r>
+            <a:r>
+              <a:rPr lang="nb-NO" dirty="0"/>
+              <a:t> </a:t>
+            </a:r>
+            <a:r>
+              <a:rPr lang="nb-NO" dirty="0" err="1"/>
+              <a:t>weight</a:t>
+            </a:r>
+            <a:r>
+              <a:rPr lang="nb-NO" dirty="0"/>
+              <a:t> </a:t>
+            </a:r>
+            <a:r>
+              <a:rPr lang="nb-NO" dirty="0" err="1"/>
+              <a:t>space</a:t>
+            </a:r>
+            <a:endParaRPr lang="en-GB" dirty="0"/>
+          </a:p>
+        </p:txBody>
+      </p:sp>
     </p:spTree>
     <p:extLst>
       <p:ext uri="{BB962C8B-B14F-4D97-AF65-F5344CB8AC3E}">
         <p14:creationId xmlns:p14="http://schemas.microsoft.com/office/powerpoint/2010/main" val="1852916941"/>
+      </p:ext>
+    </p:extLst>
+  </p:cSld>
+  <p:clrMapOvr>
+    <a:masterClrMapping/>
+  </p:clrMapOvr>
+</p:sld>
+</file>
+
+<file path=ppt/slides/slide11.xml><?xml version="1.0" encoding="utf-8"?>
+<p:sld xmlns:a="http://schemas.openxmlformats.org/drawingml/2006/main" xmlns:r="http://schemas.openxmlformats.org/officeDocument/2006/relationships" xmlns:p="http://schemas.openxmlformats.org/presentationml/2006/main">
+  <p:cSld>
+    <p:spTree>
+      <p:nvGrpSpPr>
+        <p:cNvPr id="1" name=""/>
+        <p:cNvGrpSpPr/>
+        <p:nvPr/>
+      </p:nvGrpSpPr>
+      <p:grpSpPr>
+        <a:xfrm>
+          <a:off x="0" y="0"/>
+          <a:ext cx="0" cy="0"/>
+          <a:chOff x="0" y="0"/>
+          <a:chExt cx="0" cy="0"/>
+        </a:xfrm>
+      </p:grpSpPr>
+      <p:sp>
+        <p:nvSpPr>
+          <p:cNvPr id="2" name="Title 1">
+            <a:extLst>
+              <a:ext uri="{FF2B5EF4-FFF2-40B4-BE49-F238E27FC236}">
+                <a16:creationId xmlns:a16="http://schemas.microsoft.com/office/drawing/2014/main" id="{027DF1B8-04A4-4487-8A49-3199F5CB31E2}"/>
+              </a:ext>
+            </a:extLst>
+          </p:cNvPr>
+          <p:cNvSpPr>
+            <a:spLocks noGrp="1"/>
+          </p:cNvSpPr>
+          <p:nvPr>
+            <p:ph type="title"/>
+          </p:nvPr>
+        </p:nvSpPr>
+        <p:spPr/>
+        <p:txBody>
+          <a:bodyPr/>
+          <a:lstStyle/>
+          <a:p>
+            <a:r>
+              <a:rPr lang="nb-NO" dirty="0" err="1">
+                <a:solidFill>
+                  <a:schemeClr val="tx1"/>
+                </a:solidFill>
+              </a:rPr>
+              <a:t>Current</a:t>
+            </a:r>
+            <a:r>
+              <a:rPr lang="nb-NO" dirty="0">
+                <a:solidFill>
+                  <a:schemeClr val="tx1"/>
+                </a:solidFill>
+              </a:rPr>
+              <a:t> </a:t>
+            </a:r>
+            <a:r>
+              <a:rPr lang="nb-NO" dirty="0" err="1">
+                <a:solidFill>
+                  <a:schemeClr val="tx1"/>
+                </a:solidFill>
+              </a:rPr>
+              <a:t>phase</a:t>
+            </a:r>
+            <a:r>
+              <a:rPr lang="nb-NO" dirty="0">
+                <a:solidFill>
+                  <a:schemeClr val="tx1"/>
+                </a:solidFill>
+              </a:rPr>
+              <a:t>: Data </a:t>
+            </a:r>
+            <a:r>
+              <a:rPr lang="nb-NO" dirty="0" err="1">
+                <a:solidFill>
+                  <a:schemeClr val="tx1"/>
+                </a:solidFill>
+              </a:rPr>
+              <a:t>processing</a:t>
+            </a:r>
+            <a:endParaRPr lang="en-GB" dirty="0">
+              <a:solidFill>
+                <a:schemeClr val="tx1"/>
+              </a:solidFill>
+            </a:endParaRPr>
+          </a:p>
+        </p:txBody>
+      </p:sp>
+      <p:sp>
+        <p:nvSpPr>
+          <p:cNvPr id="3" name="Content Placeholder 2">
+            <a:extLst>
+              <a:ext uri="{FF2B5EF4-FFF2-40B4-BE49-F238E27FC236}">
+                <a16:creationId xmlns:a16="http://schemas.microsoft.com/office/drawing/2014/main" id="{8E4A93AC-EC05-4E21-BD0C-A16DD2B8CDAD}"/>
+              </a:ext>
+            </a:extLst>
+          </p:cNvPr>
+          <p:cNvSpPr>
+            <a:spLocks noGrp="1"/>
+          </p:cNvSpPr>
+          <p:nvPr>
+            <p:ph idx="1"/>
+          </p:nvPr>
+        </p:nvSpPr>
+        <p:spPr>
+          <a:xfrm>
+            <a:off x="657224" y="2011680"/>
+            <a:ext cx="10753725" cy="3766185"/>
+          </a:xfrm>
+        </p:spPr>
+        <p:txBody>
+          <a:bodyPr/>
+          <a:lstStyle/>
+          <a:p>
+            <a:r>
+              <a:rPr lang="nb-NO" dirty="0"/>
+              <a:t>I </a:t>
+            </a:r>
+            <a:r>
+              <a:rPr lang="nb-NO" dirty="0" err="1"/>
+              <a:t>expect</a:t>
+            </a:r>
+            <a:r>
+              <a:rPr lang="nb-NO" dirty="0"/>
+              <a:t> to </a:t>
+            </a:r>
+            <a:r>
+              <a:rPr lang="nb-NO" dirty="0" err="1"/>
+              <a:t>get</a:t>
+            </a:r>
+            <a:r>
+              <a:rPr lang="nb-NO" dirty="0"/>
+              <a:t> </a:t>
+            </a:r>
+            <a:r>
+              <a:rPr lang="nb-NO" dirty="0" err="1"/>
+              <a:t>started</a:t>
+            </a:r>
+            <a:r>
+              <a:rPr lang="nb-NO" dirty="0"/>
+              <a:t> </a:t>
+            </a:r>
+            <a:r>
+              <a:rPr lang="nb-NO" dirty="0" err="1"/>
+              <a:t>on</a:t>
+            </a:r>
+            <a:r>
+              <a:rPr lang="nb-NO" dirty="0"/>
+              <a:t>:</a:t>
+            </a:r>
+          </a:p>
+          <a:p>
+            <a:r>
+              <a:rPr lang="nb-NO" dirty="0"/>
+              <a:t>Robust </a:t>
+            </a:r>
+            <a:r>
+              <a:rPr lang="nb-NO" dirty="0" err="1"/>
+              <a:t>automatic</a:t>
+            </a:r>
+            <a:r>
+              <a:rPr lang="nb-NO" dirty="0"/>
+              <a:t> </a:t>
+            </a:r>
+            <a:r>
+              <a:rPr lang="nb-NO" dirty="0" err="1"/>
+              <a:t>dataset</a:t>
+            </a:r>
+            <a:r>
+              <a:rPr lang="nb-NO" dirty="0"/>
+              <a:t> </a:t>
+            </a:r>
+            <a:r>
+              <a:rPr lang="nb-NO" dirty="0" err="1"/>
+              <a:t>generation</a:t>
+            </a:r>
+            <a:endParaRPr lang="nb-NO" dirty="0"/>
+          </a:p>
+          <a:p>
+            <a:r>
+              <a:rPr lang="nb-NO" dirty="0"/>
+              <a:t>Data </a:t>
+            </a:r>
+            <a:r>
+              <a:rPr lang="nb-NO" dirty="0" err="1"/>
+              <a:t>preperation</a:t>
+            </a:r>
+            <a:endParaRPr lang="nb-NO" dirty="0"/>
+          </a:p>
+          <a:p>
+            <a:pPr lvl="1"/>
+            <a:r>
+              <a:rPr lang="nb-NO" dirty="0" err="1"/>
+              <a:t>Normalization</a:t>
+            </a:r>
+            <a:r>
+              <a:rPr lang="nb-NO" dirty="0"/>
+              <a:t>, </a:t>
+            </a:r>
+            <a:r>
+              <a:rPr lang="nb-NO" dirty="0" err="1"/>
+              <a:t>extracting</a:t>
+            </a:r>
+            <a:r>
+              <a:rPr lang="nb-NO" dirty="0"/>
+              <a:t> </a:t>
+            </a:r>
+            <a:r>
+              <a:rPr lang="nb-NO" dirty="0" err="1"/>
+              <a:t>outliers</a:t>
+            </a:r>
+            <a:r>
+              <a:rPr lang="nb-NO" dirty="0"/>
+              <a:t> </a:t>
+            </a:r>
+            <a:r>
+              <a:rPr lang="nb-NO" dirty="0" err="1"/>
+              <a:t>etc</a:t>
+            </a:r>
+            <a:endParaRPr lang="nb-NO" dirty="0"/>
+          </a:p>
+          <a:p>
+            <a:pPr lvl="1"/>
+            <a:endParaRPr lang="nb-NO" dirty="0"/>
+          </a:p>
+          <a:p>
+            <a:pPr marL="4572" lvl="1" indent="0">
+              <a:buNone/>
+            </a:pPr>
+            <a:r>
+              <a:rPr lang="nb-NO" dirty="0" err="1"/>
+              <a:t>Correlation</a:t>
+            </a:r>
+            <a:r>
+              <a:rPr lang="nb-NO" dirty="0"/>
+              <a:t> </a:t>
+            </a:r>
+            <a:r>
+              <a:rPr lang="nb-NO" dirty="0" err="1"/>
+              <a:t>of</a:t>
+            </a:r>
+            <a:r>
+              <a:rPr lang="nb-NO" dirty="0"/>
+              <a:t> </a:t>
+            </a:r>
+            <a:r>
+              <a:rPr lang="nb-NO" dirty="0" err="1"/>
+              <a:t>seismic</a:t>
+            </a:r>
+            <a:r>
+              <a:rPr lang="nb-NO" dirty="0"/>
+              <a:t> and target:</a:t>
+            </a:r>
+          </a:p>
+          <a:p>
+            <a:pPr marL="4572" lvl="1" indent="0">
+              <a:buNone/>
+            </a:pPr>
+            <a:r>
+              <a:rPr lang="en-GB" dirty="0"/>
+              <a:t>Seismic traces and </a:t>
+            </a:r>
+            <a:r>
+              <a:rPr lang="en-GB" dirty="0" err="1"/>
+              <a:t>cpt</a:t>
+            </a:r>
+            <a:r>
+              <a:rPr lang="en-GB" dirty="0"/>
+              <a:t>-locations/ai</a:t>
+            </a:r>
+          </a:p>
+          <a:p>
+            <a:pPr marL="4572" lvl="1" indent="0">
+              <a:buNone/>
+            </a:pPr>
+            <a:r>
+              <a:rPr lang="en-GB" dirty="0"/>
+              <a:t> -&gt; </a:t>
+            </a:r>
+            <a:r>
+              <a:rPr lang="en-GB" i="1" dirty="0"/>
+              <a:t>Cardinality issue</a:t>
+            </a:r>
+          </a:p>
+          <a:p>
+            <a:pPr marL="4572" lvl="1" indent="0">
+              <a:buNone/>
+            </a:pPr>
+            <a:r>
+              <a:rPr lang="en-GB" dirty="0"/>
+              <a:t>	first value is slightly different</a:t>
+            </a:r>
+          </a:p>
+        </p:txBody>
+      </p:sp>
+      <p:pic>
+        <p:nvPicPr>
+          <p:cNvPr id="5" name="Picture 4">
+            <a:extLst>
+              <a:ext uri="{FF2B5EF4-FFF2-40B4-BE49-F238E27FC236}">
+                <a16:creationId xmlns:a16="http://schemas.microsoft.com/office/drawing/2014/main" id="{D9E405C5-CD4F-4D20-AA52-16A4743A2A0B}"/>
+              </a:ext>
+            </a:extLst>
+          </p:cNvPr>
+          <p:cNvPicPr>
+            <a:picLocks noChangeAspect="1"/>
+          </p:cNvPicPr>
+          <p:nvPr/>
+        </p:nvPicPr>
+        <p:blipFill>
+          <a:blip r:embed="rId2"/>
+          <a:stretch>
+            <a:fillRect/>
+          </a:stretch>
+        </p:blipFill>
+        <p:spPr>
+          <a:xfrm>
+            <a:off x="6043611" y="4602994"/>
+            <a:ext cx="1876425" cy="952500"/>
+          </a:xfrm>
+          <a:prstGeom prst="rect">
+            <a:avLst/>
+          </a:prstGeom>
+        </p:spPr>
+      </p:pic>
+    </p:spTree>
+    <p:extLst>
+      <p:ext uri="{BB962C8B-B14F-4D97-AF65-F5344CB8AC3E}">
+        <p14:creationId xmlns:p14="http://schemas.microsoft.com/office/powerpoint/2010/main" val="4094732326"/>
+      </p:ext>
+    </p:extLst>
+  </p:cSld>
+  <p:clrMapOvr>
+    <a:masterClrMapping/>
+  </p:clrMapOvr>
+</p:sld>
+</file>
+
+<file path=ppt/slides/slide12.xml><?xml version="1.0" encoding="utf-8"?>
+<p:sld xmlns:a="http://schemas.openxmlformats.org/drawingml/2006/main" xmlns:r="http://schemas.openxmlformats.org/officeDocument/2006/relationships" xmlns:p="http://schemas.openxmlformats.org/presentationml/2006/main">
+  <p:cSld>
+    <p:spTree>
+      <p:nvGrpSpPr>
+        <p:cNvPr id="1" name=""/>
+        <p:cNvGrpSpPr/>
+        <p:nvPr/>
+      </p:nvGrpSpPr>
+      <p:grpSpPr>
+        <a:xfrm>
+          <a:off x="0" y="0"/>
+          <a:ext cx="0" cy="0"/>
+          <a:chOff x="0" y="0"/>
+          <a:chExt cx="0" cy="0"/>
+        </a:xfrm>
+      </p:grpSpPr>
+      <p:sp>
+        <p:nvSpPr>
+          <p:cNvPr id="2" name="Title 1">
+            <a:extLst>
+              <a:ext uri="{FF2B5EF4-FFF2-40B4-BE49-F238E27FC236}">
+                <a16:creationId xmlns:a16="http://schemas.microsoft.com/office/drawing/2014/main" id="{B3DA2B5D-FB92-4FA8-8786-BFEF1963E874}"/>
+              </a:ext>
+            </a:extLst>
+          </p:cNvPr>
+          <p:cNvSpPr>
+            <a:spLocks noGrp="1"/>
+          </p:cNvSpPr>
+          <p:nvPr>
+            <p:ph type="title"/>
+          </p:nvPr>
+        </p:nvSpPr>
+        <p:spPr/>
+        <p:txBody>
+          <a:bodyPr/>
+          <a:lstStyle/>
+          <a:p>
+            <a:r>
+              <a:rPr lang="nb-NO" dirty="0">
+                <a:solidFill>
+                  <a:schemeClr val="tx1"/>
+                </a:solidFill>
+              </a:rPr>
+              <a:t>State </a:t>
+            </a:r>
+            <a:r>
+              <a:rPr lang="nb-NO" dirty="0" err="1">
+                <a:solidFill>
+                  <a:schemeClr val="tx1"/>
+                </a:solidFill>
+              </a:rPr>
+              <a:t>of</a:t>
+            </a:r>
+            <a:r>
+              <a:rPr lang="nb-NO" dirty="0">
+                <a:solidFill>
+                  <a:schemeClr val="tx1"/>
+                </a:solidFill>
+              </a:rPr>
+              <a:t> </a:t>
+            </a:r>
+            <a:r>
+              <a:rPr lang="nb-NO" dirty="0" err="1">
+                <a:solidFill>
+                  <a:schemeClr val="tx1"/>
+                </a:solidFill>
+              </a:rPr>
+              <a:t>affairs</a:t>
+            </a:r>
+            <a:endParaRPr lang="en-GB" dirty="0">
+              <a:solidFill>
+                <a:schemeClr val="tx1"/>
+              </a:solidFill>
+            </a:endParaRPr>
+          </a:p>
+        </p:txBody>
+      </p:sp>
+      <p:sp>
+        <p:nvSpPr>
+          <p:cNvPr id="3" name="Content Placeholder 2">
+            <a:extLst>
+              <a:ext uri="{FF2B5EF4-FFF2-40B4-BE49-F238E27FC236}">
+                <a16:creationId xmlns:a16="http://schemas.microsoft.com/office/drawing/2014/main" id="{E18E882A-1822-46E8-991B-6C99461F3705}"/>
+              </a:ext>
+            </a:extLst>
+          </p:cNvPr>
+          <p:cNvSpPr>
+            <a:spLocks noGrp="1"/>
+          </p:cNvSpPr>
+          <p:nvPr>
+            <p:ph idx="1"/>
+          </p:nvPr>
+        </p:nvSpPr>
+        <p:spPr/>
+        <p:txBody>
+          <a:bodyPr/>
+          <a:lstStyle/>
+          <a:p>
+            <a:r>
+              <a:rPr lang="nb-NO" dirty="0" err="1"/>
+              <a:t>Cardinality</a:t>
+            </a:r>
+            <a:r>
+              <a:rPr lang="nb-NO" dirty="0"/>
+              <a:t> </a:t>
+            </a:r>
+            <a:r>
+              <a:rPr lang="nb-NO" dirty="0" err="1"/>
+              <a:t>issue</a:t>
+            </a:r>
+            <a:r>
+              <a:rPr lang="nb-NO" dirty="0"/>
+              <a:t>, and </a:t>
+            </a:r>
+            <a:r>
+              <a:rPr lang="nb-NO" dirty="0" err="1"/>
+              <a:t>good</a:t>
+            </a:r>
+            <a:r>
+              <a:rPr lang="nb-NO" dirty="0"/>
+              <a:t> </a:t>
+            </a:r>
+            <a:r>
+              <a:rPr lang="nb-NO" dirty="0" err="1"/>
+              <a:t>dataset</a:t>
+            </a:r>
+            <a:r>
+              <a:rPr lang="nb-NO" dirty="0"/>
+              <a:t> management is </a:t>
+            </a:r>
+            <a:r>
+              <a:rPr lang="nb-NO" dirty="0" err="1"/>
+              <a:t>the</a:t>
+            </a:r>
+            <a:r>
+              <a:rPr lang="nb-NO" dirty="0"/>
+              <a:t> </a:t>
+            </a:r>
+            <a:r>
+              <a:rPr lang="nb-NO" dirty="0" err="1"/>
+              <a:t>only</a:t>
+            </a:r>
+            <a:r>
+              <a:rPr lang="nb-NO" dirty="0"/>
+              <a:t> </a:t>
+            </a:r>
+            <a:r>
+              <a:rPr lang="nb-NO" dirty="0" err="1"/>
+              <a:t>thing</a:t>
+            </a:r>
+            <a:r>
+              <a:rPr lang="nb-NO" dirty="0"/>
+              <a:t> </a:t>
+            </a:r>
+            <a:r>
+              <a:rPr lang="nb-NO" dirty="0" err="1"/>
+              <a:t>thats</a:t>
+            </a:r>
+            <a:r>
+              <a:rPr lang="nb-NO" dirty="0"/>
+              <a:t> preventing </a:t>
+            </a:r>
+            <a:r>
+              <a:rPr lang="nb-NO" dirty="0" err="1"/>
+              <a:t>me</a:t>
+            </a:r>
+            <a:r>
+              <a:rPr lang="nb-NO" dirty="0"/>
+              <a:t> from </a:t>
+            </a:r>
+            <a:r>
+              <a:rPr lang="nb-NO" dirty="0" err="1"/>
+              <a:t>running</a:t>
+            </a:r>
+            <a:r>
+              <a:rPr lang="nb-NO" dirty="0"/>
+              <a:t> </a:t>
+            </a:r>
+            <a:r>
+              <a:rPr lang="nb-NO" dirty="0" err="1"/>
+              <a:t>lots</a:t>
+            </a:r>
+            <a:r>
+              <a:rPr lang="nb-NO" dirty="0"/>
+              <a:t> </a:t>
+            </a:r>
+            <a:r>
+              <a:rPr lang="nb-NO" dirty="0" err="1"/>
+              <a:t>of</a:t>
+            </a:r>
+            <a:r>
+              <a:rPr lang="nb-NO" dirty="0"/>
+              <a:t> </a:t>
+            </a:r>
+            <a:r>
+              <a:rPr lang="nb-NO" dirty="0" err="1"/>
+              <a:t>models</a:t>
+            </a:r>
+            <a:r>
+              <a:rPr lang="nb-NO" dirty="0"/>
+              <a:t>.</a:t>
+            </a:r>
+          </a:p>
+          <a:p>
+            <a:r>
+              <a:rPr lang="nb-NO" dirty="0"/>
+              <a:t>How to do </a:t>
+            </a:r>
+            <a:r>
+              <a:rPr lang="nb-NO" dirty="0" err="1"/>
+              <a:t>good</a:t>
+            </a:r>
+            <a:r>
+              <a:rPr lang="nb-NO" dirty="0"/>
+              <a:t> </a:t>
+            </a:r>
+            <a:r>
+              <a:rPr lang="nb-NO" dirty="0" err="1"/>
+              <a:t>correlations</a:t>
+            </a:r>
+            <a:r>
+              <a:rPr lang="nb-NO" dirty="0"/>
+              <a:t>?</a:t>
+            </a:r>
+          </a:p>
+          <a:p>
+            <a:pPr lvl="1"/>
+            <a:r>
+              <a:rPr lang="nb-NO" dirty="0"/>
+              <a:t>GPS data in </a:t>
+            </a:r>
+            <a:r>
+              <a:rPr lang="nb-NO" dirty="0" err="1"/>
+              <a:t>sgy</a:t>
+            </a:r>
+            <a:r>
+              <a:rPr lang="nb-NO" dirty="0"/>
+              <a:t>?</a:t>
+            </a:r>
+          </a:p>
+          <a:p>
+            <a:pPr marL="4572" lvl="1" indent="0">
+              <a:buNone/>
+            </a:pPr>
+            <a:endParaRPr lang="nb-NO" dirty="0"/>
+          </a:p>
+          <a:p>
+            <a:pPr marL="4572" lvl="1" indent="0">
+              <a:buNone/>
+            </a:pPr>
+            <a:r>
+              <a:rPr lang="nb-NO" dirty="0" err="1"/>
+              <a:t>Also</a:t>
+            </a:r>
+            <a:r>
+              <a:rPr lang="nb-NO" dirty="0"/>
+              <a:t> </a:t>
+            </a:r>
+            <a:r>
+              <a:rPr lang="nb-NO" dirty="0" err="1"/>
+              <a:t>need</a:t>
+            </a:r>
+            <a:r>
+              <a:rPr lang="nb-NO" dirty="0"/>
+              <a:t> to do </a:t>
+            </a:r>
+            <a:r>
+              <a:rPr lang="nb-NO" dirty="0" err="1"/>
+              <a:t>correlation</a:t>
+            </a:r>
+            <a:r>
+              <a:rPr lang="nb-NO" dirty="0"/>
+              <a:t> by </a:t>
+            </a:r>
+            <a:r>
+              <a:rPr lang="nb-NO" dirty="0" err="1"/>
+              <a:t>depth</a:t>
+            </a:r>
+            <a:endParaRPr lang="nb-NO" dirty="0"/>
+          </a:p>
+          <a:p>
+            <a:pPr marL="4572" lvl="1" indent="0">
+              <a:buNone/>
+            </a:pPr>
+            <a:r>
+              <a:rPr lang="nb-NO" dirty="0"/>
+              <a:t>	</a:t>
+            </a:r>
+            <a:r>
+              <a:rPr lang="nb-NO" dirty="0" err="1"/>
+              <a:t>What</a:t>
+            </a:r>
+            <a:r>
+              <a:rPr lang="nb-NO" dirty="0"/>
+              <a:t> </a:t>
+            </a:r>
+            <a:r>
+              <a:rPr lang="nb-NO" dirty="0" err="1"/>
+              <a:t>depth</a:t>
+            </a:r>
+            <a:r>
+              <a:rPr lang="nb-NO" dirty="0"/>
+              <a:t> is </a:t>
+            </a:r>
+            <a:r>
+              <a:rPr lang="nb-NO" dirty="0" err="1"/>
+              <a:t>of</a:t>
+            </a:r>
+            <a:r>
+              <a:rPr lang="nb-NO" dirty="0"/>
+              <a:t> </a:t>
+            </a:r>
+            <a:r>
+              <a:rPr lang="nb-NO" dirty="0" err="1"/>
+              <a:t>interest</a:t>
+            </a:r>
+            <a:endParaRPr lang="en-GB" dirty="0"/>
+          </a:p>
+        </p:txBody>
+      </p:sp>
+    </p:spTree>
+    <p:extLst>
+      <p:ext uri="{BB962C8B-B14F-4D97-AF65-F5344CB8AC3E}">
+        <p14:creationId xmlns:p14="http://schemas.microsoft.com/office/powerpoint/2010/main" val="1394708332"/>
+      </p:ext>
+    </p:extLst>
+  </p:cSld>
+  <p:clrMapOvr>
+    <a:masterClrMapping/>
+  </p:clrMapOvr>
+</p:sld>
+</file>
+
+<file path=ppt/slides/slide13.xml><?xml version="1.0" encoding="utf-8"?>
+<p:sld xmlns:a="http://schemas.openxmlformats.org/drawingml/2006/main" xmlns:r="http://schemas.openxmlformats.org/officeDocument/2006/relationships" xmlns:p="http://schemas.openxmlformats.org/presentationml/2006/main">
+  <p:cSld>
+    <p:spTree>
+      <p:nvGrpSpPr>
+        <p:cNvPr id="1" name=""/>
+        <p:cNvGrpSpPr/>
+        <p:nvPr/>
+      </p:nvGrpSpPr>
+      <p:grpSpPr>
+        <a:xfrm>
+          <a:off x="0" y="0"/>
+          <a:ext cx="0" cy="0"/>
+          <a:chOff x="0" y="0"/>
+          <a:chExt cx="0" cy="0"/>
+        </a:xfrm>
+      </p:grpSpPr>
+      <p:sp>
+        <p:nvSpPr>
+          <p:cNvPr id="2" name="Title 1">
+            <a:extLst>
+              <a:ext uri="{FF2B5EF4-FFF2-40B4-BE49-F238E27FC236}">
+                <a16:creationId xmlns:a16="http://schemas.microsoft.com/office/drawing/2014/main" id="{961CBB91-FD22-48B8-B9ED-C0B7197C88EA}"/>
+              </a:ext>
+            </a:extLst>
+          </p:cNvPr>
+          <p:cNvSpPr>
+            <a:spLocks noGrp="1"/>
+          </p:cNvSpPr>
+          <p:nvPr>
+            <p:ph type="title"/>
+          </p:nvPr>
+        </p:nvSpPr>
+        <p:spPr/>
+        <p:txBody>
+          <a:bodyPr/>
+          <a:lstStyle/>
+          <a:p>
+            <a:r>
+              <a:rPr lang="nb-NO" dirty="0" err="1">
+                <a:solidFill>
+                  <a:schemeClr val="tx1"/>
+                </a:solidFill>
+              </a:rPr>
+              <a:t>Further</a:t>
+            </a:r>
+            <a:r>
+              <a:rPr lang="nb-NO" dirty="0">
+                <a:solidFill>
+                  <a:schemeClr val="tx1"/>
+                </a:solidFill>
+              </a:rPr>
+              <a:t> </a:t>
+            </a:r>
+            <a:r>
+              <a:rPr lang="nb-NO" dirty="0" err="1">
+                <a:solidFill>
+                  <a:schemeClr val="tx1"/>
+                </a:solidFill>
+              </a:rPr>
+              <a:t>work</a:t>
+            </a:r>
+            <a:endParaRPr lang="en-GB" dirty="0">
+              <a:solidFill>
+                <a:schemeClr val="tx1"/>
+              </a:solidFill>
+            </a:endParaRPr>
+          </a:p>
+        </p:txBody>
+      </p:sp>
+      <p:sp>
+        <p:nvSpPr>
+          <p:cNvPr id="3" name="Content Placeholder 2">
+            <a:extLst>
+              <a:ext uri="{FF2B5EF4-FFF2-40B4-BE49-F238E27FC236}">
+                <a16:creationId xmlns:a16="http://schemas.microsoft.com/office/drawing/2014/main" id="{BCA8EC2D-B773-4449-BFCE-DD601EDD4CD3}"/>
+              </a:ext>
+            </a:extLst>
+          </p:cNvPr>
+          <p:cNvSpPr>
+            <a:spLocks noGrp="1"/>
+          </p:cNvSpPr>
+          <p:nvPr>
+            <p:ph idx="1"/>
+          </p:nvPr>
+        </p:nvSpPr>
+        <p:spPr/>
+        <p:txBody>
+          <a:bodyPr>
+            <a:normAutofit fontScale="70000" lnSpcReduction="20000"/>
+          </a:bodyPr>
+          <a:lstStyle/>
+          <a:p>
+            <a:r>
+              <a:rPr lang="nb-NO" dirty="0" err="1"/>
+              <a:t>Visualization</a:t>
+            </a:r>
+            <a:r>
+              <a:rPr lang="nb-NO" dirty="0"/>
+              <a:t> script still has not </a:t>
+            </a:r>
+            <a:r>
+              <a:rPr lang="nb-NO" dirty="0" err="1"/>
+              <a:t>been</a:t>
+            </a:r>
+            <a:r>
+              <a:rPr lang="nb-NO" dirty="0"/>
+              <a:t> </a:t>
+            </a:r>
+            <a:r>
+              <a:rPr lang="nb-NO" dirty="0" err="1"/>
+              <a:t>written</a:t>
+            </a:r>
+            <a:endParaRPr lang="nb-NO" dirty="0"/>
+          </a:p>
+          <a:p>
+            <a:pPr lvl="1"/>
+            <a:r>
+              <a:rPr lang="nb-NO" dirty="0"/>
+              <a:t>Will </a:t>
+            </a:r>
+            <a:r>
+              <a:rPr lang="nb-NO" dirty="0" err="1"/>
+              <a:t>incorporate</a:t>
+            </a:r>
+            <a:r>
+              <a:rPr lang="nb-NO" dirty="0"/>
+              <a:t>:</a:t>
+            </a:r>
+          </a:p>
+          <a:p>
+            <a:pPr lvl="2">
+              <a:buFont typeface="Wingdings" panose="05000000000000000000" pitchFamily="2" charset="2"/>
+              <a:buChar char="§"/>
+            </a:pPr>
+            <a:r>
+              <a:rPr lang="en-GB" dirty="0"/>
+              <a:t>Loss function over time</a:t>
+            </a:r>
+          </a:p>
+          <a:p>
+            <a:pPr lvl="2">
+              <a:buFont typeface="Wingdings" panose="05000000000000000000" pitchFamily="2" charset="2"/>
+              <a:buChar char="§"/>
+            </a:pPr>
+            <a:r>
+              <a:rPr lang="en-GB" dirty="0"/>
+              <a:t>Best &amp; worst areas for reconstruction (monochrome w/ red details for error)</a:t>
+            </a:r>
+          </a:p>
+          <a:p>
+            <a:pPr lvl="2">
+              <a:buFont typeface="Wingdings" panose="05000000000000000000" pitchFamily="2" charset="2"/>
+              <a:buChar char="§"/>
+            </a:pPr>
+            <a:r>
+              <a:rPr lang="en-GB" dirty="0"/>
+              <a:t>Image of target prediction</a:t>
+            </a:r>
+          </a:p>
+          <a:p>
+            <a:pPr lvl="2">
+              <a:buFont typeface="Wingdings" panose="05000000000000000000" pitchFamily="2" charset="2"/>
+              <a:buChar char="§"/>
+            </a:pPr>
+            <a:r>
+              <a:rPr lang="en-GB" dirty="0"/>
+              <a:t>List over what datasets were used</a:t>
+            </a:r>
+          </a:p>
+          <a:p>
+            <a:pPr lvl="2">
+              <a:buFont typeface="Wingdings" panose="05000000000000000000" pitchFamily="2" charset="2"/>
+              <a:buChar char="§"/>
+            </a:pPr>
+            <a:r>
+              <a:rPr lang="en-GB" dirty="0"/>
+              <a:t>Summary statistics</a:t>
+            </a:r>
+          </a:p>
+          <a:p>
+            <a:pPr lvl="2">
+              <a:buFont typeface="Wingdings" panose="05000000000000000000" pitchFamily="2" charset="2"/>
+              <a:buChar char="§"/>
+            </a:pPr>
+            <a:r>
+              <a:rPr lang="en-GB" dirty="0"/>
+              <a:t>Some model input parameters</a:t>
+            </a:r>
+          </a:p>
+          <a:p>
+            <a:pPr marL="4572" lvl="1" indent="0">
+              <a:buNone/>
+            </a:pPr>
+            <a:endParaRPr lang="en-GB" dirty="0"/>
+          </a:p>
+          <a:p>
+            <a:pPr marL="4572" lvl="1" indent="0">
+              <a:buNone/>
+            </a:pPr>
+            <a:r>
+              <a:rPr lang="en-GB" dirty="0" err="1"/>
+              <a:t>TensorBoard</a:t>
+            </a:r>
+            <a:r>
+              <a:rPr lang="en-GB" dirty="0"/>
+              <a:t> is soon up and running:</a:t>
+            </a:r>
+          </a:p>
+          <a:p>
+            <a:pPr marL="4572" lvl="1" indent="0">
+              <a:buNone/>
+            </a:pPr>
+            <a:r>
+              <a:rPr lang="en-GB" dirty="0"/>
+              <a:t>Only needs a little troubleshooting…</a:t>
+            </a:r>
+          </a:p>
+          <a:p>
+            <a:pPr marL="4572" lvl="1" indent="0">
+              <a:buNone/>
+            </a:pPr>
+            <a:r>
+              <a:rPr lang="en-GB" dirty="0"/>
+              <a:t>This will allow for me to see how well the training is utilizing the GPU</a:t>
+            </a:r>
+          </a:p>
+          <a:p>
+            <a:pPr marL="4572" lvl="1" indent="0">
+              <a:buNone/>
+            </a:pPr>
+            <a:endParaRPr lang="en-GB" dirty="0"/>
+          </a:p>
+          <a:p>
+            <a:pPr marL="4572" lvl="1" indent="0">
+              <a:buNone/>
+            </a:pPr>
+            <a:r>
+              <a:rPr lang="en-GB" dirty="0"/>
+              <a:t>May look at using 16bit float for increased computation power</a:t>
+            </a:r>
+          </a:p>
+          <a:p>
+            <a:pPr marL="4572" lvl="1" indent="0">
+              <a:buNone/>
+            </a:pPr>
+            <a:endParaRPr lang="en-GB" dirty="0"/>
+          </a:p>
+          <a:p>
+            <a:pPr marL="4572" lvl="1" indent="0">
+              <a:buNone/>
+            </a:pPr>
+            <a:r>
+              <a:rPr lang="en-GB" dirty="0"/>
+              <a:t>Huge flatten layers..</a:t>
+            </a:r>
+          </a:p>
+        </p:txBody>
+      </p:sp>
+    </p:spTree>
+    <p:extLst>
+      <p:ext uri="{BB962C8B-B14F-4D97-AF65-F5344CB8AC3E}">
+        <p14:creationId xmlns:p14="http://schemas.microsoft.com/office/powerpoint/2010/main" val="380937919"/>
+      </p:ext>
+    </p:extLst>
+  </p:cSld>
+  <p:clrMapOvr>
+    <a:masterClrMapping/>
+  </p:clrMapOvr>
+</p:sld>
+</file>
+
+<file path=ppt/slides/slide14.xml><?xml version="1.0" encoding="utf-8"?>
+<p:sld xmlns:a="http://schemas.openxmlformats.org/drawingml/2006/main" xmlns:r="http://schemas.openxmlformats.org/officeDocument/2006/relationships" xmlns:p="http://schemas.openxmlformats.org/presentationml/2006/main">
+  <p:cSld>
+    <p:spTree>
+      <p:nvGrpSpPr>
+        <p:cNvPr id="1" name=""/>
+        <p:cNvGrpSpPr/>
+        <p:nvPr/>
+      </p:nvGrpSpPr>
+      <p:grpSpPr>
+        <a:xfrm>
+          <a:off x="0" y="0"/>
+          <a:ext cx="0" cy="0"/>
+          <a:chOff x="0" y="0"/>
+          <a:chExt cx="0" cy="0"/>
+        </a:xfrm>
+      </p:grpSpPr>
+      <p:sp>
+        <p:nvSpPr>
+          <p:cNvPr id="2" name="Title 1">
+            <a:extLst>
+              <a:ext uri="{FF2B5EF4-FFF2-40B4-BE49-F238E27FC236}">
+                <a16:creationId xmlns:a16="http://schemas.microsoft.com/office/drawing/2014/main" id="{6B283408-BB91-4F30-AEBA-837D0C36FA3A}"/>
+              </a:ext>
+            </a:extLst>
+          </p:cNvPr>
+          <p:cNvSpPr>
+            <a:spLocks noGrp="1"/>
+          </p:cNvSpPr>
+          <p:nvPr>
+            <p:ph type="title"/>
+          </p:nvPr>
+        </p:nvSpPr>
+        <p:spPr/>
+        <p:txBody>
+          <a:bodyPr/>
+          <a:lstStyle/>
+          <a:p>
+            <a:r>
+              <a:rPr lang="nb-NO" dirty="0">
+                <a:solidFill>
+                  <a:schemeClr val="tx1"/>
+                </a:solidFill>
+              </a:rPr>
+              <a:t>Scope and </a:t>
+            </a:r>
+            <a:r>
+              <a:rPr lang="nb-NO" dirty="0" err="1">
+                <a:solidFill>
+                  <a:schemeClr val="tx1"/>
+                </a:solidFill>
+              </a:rPr>
+              <a:t>ambition</a:t>
+            </a:r>
+            <a:r>
+              <a:rPr lang="nb-NO" dirty="0">
+                <a:solidFill>
+                  <a:schemeClr val="tx1"/>
+                </a:solidFill>
+              </a:rPr>
+              <a:t> </a:t>
+            </a:r>
+            <a:r>
+              <a:rPr lang="nb-NO" dirty="0" err="1">
+                <a:solidFill>
+                  <a:schemeClr val="tx1"/>
+                </a:solidFill>
+              </a:rPr>
+              <a:t>adjustment</a:t>
+            </a:r>
+            <a:endParaRPr lang="en-GB" dirty="0">
+              <a:solidFill>
+                <a:schemeClr val="tx1"/>
+              </a:solidFill>
+            </a:endParaRPr>
+          </a:p>
+        </p:txBody>
+      </p:sp>
+      <p:sp>
+        <p:nvSpPr>
+          <p:cNvPr id="3" name="Content Placeholder 2">
+            <a:extLst>
+              <a:ext uri="{FF2B5EF4-FFF2-40B4-BE49-F238E27FC236}">
+                <a16:creationId xmlns:a16="http://schemas.microsoft.com/office/drawing/2014/main" id="{8A87F90D-4D82-4122-B07C-01534A564F7E}"/>
+              </a:ext>
+            </a:extLst>
+          </p:cNvPr>
+          <p:cNvSpPr>
+            <a:spLocks noGrp="1"/>
+          </p:cNvSpPr>
+          <p:nvPr>
+            <p:ph idx="1"/>
+          </p:nvPr>
+        </p:nvSpPr>
+        <p:spPr/>
+        <p:txBody>
+          <a:bodyPr/>
+          <a:lstStyle/>
+          <a:p>
+            <a:r>
+              <a:rPr lang="nb-NO" dirty="0"/>
+              <a:t>I </a:t>
+            </a:r>
+            <a:r>
+              <a:rPr lang="nb-NO" dirty="0" err="1"/>
+              <a:t>think</a:t>
+            </a:r>
+            <a:r>
+              <a:rPr lang="nb-NO" dirty="0"/>
+              <a:t> I </a:t>
+            </a:r>
+            <a:r>
+              <a:rPr lang="nb-NO" dirty="0" err="1"/>
+              <a:t>can</a:t>
+            </a:r>
+            <a:r>
+              <a:rPr lang="nb-NO" dirty="0"/>
+              <a:t> </a:t>
+            </a:r>
+            <a:r>
+              <a:rPr lang="nb-NO" dirty="0" err="1"/>
+              <a:t>manage</a:t>
+            </a:r>
+            <a:r>
+              <a:rPr lang="nb-NO" dirty="0"/>
+              <a:t> to </a:t>
+            </a:r>
+            <a:r>
+              <a:rPr lang="nb-NO" dirty="0" err="1"/>
+              <a:t>get</a:t>
+            </a:r>
+            <a:r>
+              <a:rPr lang="nb-NO" dirty="0"/>
+              <a:t> </a:t>
+            </a:r>
+            <a:r>
+              <a:rPr lang="nb-NO" dirty="0" err="1"/>
+              <a:t>feature</a:t>
+            </a:r>
+            <a:r>
+              <a:rPr lang="nb-NO" dirty="0"/>
+              <a:t> </a:t>
+            </a:r>
+            <a:r>
+              <a:rPr lang="nb-NO" dirty="0" err="1"/>
+              <a:t>augmentation</a:t>
+            </a:r>
+            <a:r>
+              <a:rPr lang="nb-NO" dirty="0"/>
+              <a:t> done </a:t>
+            </a:r>
+            <a:r>
+              <a:rPr lang="nb-NO" dirty="0" err="1"/>
+              <a:t>before</a:t>
+            </a:r>
+            <a:r>
+              <a:rPr lang="nb-NO" dirty="0"/>
+              <a:t> </a:t>
+            </a:r>
+            <a:r>
+              <a:rPr lang="nb-NO" dirty="0" err="1"/>
+              <a:t>christmas</a:t>
+            </a:r>
+            <a:endParaRPr lang="nb-NO" dirty="0"/>
+          </a:p>
+          <a:p>
+            <a:r>
+              <a:rPr lang="nb-NO" dirty="0"/>
+              <a:t>In </a:t>
+            </a:r>
+            <a:r>
+              <a:rPr lang="nb-NO" dirty="0" err="1"/>
+              <a:t>that</a:t>
+            </a:r>
+            <a:r>
+              <a:rPr lang="nb-NO" dirty="0"/>
+              <a:t> case I </a:t>
+            </a:r>
+            <a:r>
+              <a:rPr lang="nb-NO" dirty="0" err="1"/>
+              <a:t>will</a:t>
+            </a:r>
+            <a:r>
+              <a:rPr lang="nb-NO" dirty="0"/>
+              <a:t> be </a:t>
+            </a:r>
+            <a:r>
+              <a:rPr lang="nb-NO" dirty="0" err="1"/>
+              <a:t>having</a:t>
+            </a:r>
+            <a:r>
+              <a:rPr lang="nb-NO" dirty="0"/>
+              <a:t> </a:t>
+            </a:r>
+            <a:r>
+              <a:rPr lang="nb-NO" dirty="0" err="1"/>
+              <a:t>the</a:t>
+            </a:r>
+            <a:r>
+              <a:rPr lang="nb-NO" dirty="0"/>
+              <a:t> desktop </a:t>
+            </a:r>
+            <a:r>
+              <a:rPr lang="nb-NO" dirty="0" err="1"/>
+              <a:t>running</a:t>
+            </a:r>
+            <a:r>
+              <a:rPr lang="nb-NO" dirty="0"/>
+              <a:t> </a:t>
+            </a:r>
+            <a:r>
+              <a:rPr lang="nb-NO" dirty="0" err="1"/>
+              <a:t>optuna</a:t>
+            </a:r>
+            <a:r>
+              <a:rPr lang="nb-NO" dirty="0"/>
+              <a:t> all </a:t>
+            </a:r>
+            <a:r>
+              <a:rPr lang="nb-NO" dirty="0" err="1"/>
+              <a:t>through</a:t>
+            </a:r>
+            <a:r>
+              <a:rPr lang="nb-NO" dirty="0"/>
+              <a:t> </a:t>
+            </a:r>
+            <a:r>
+              <a:rPr lang="nb-NO" dirty="0" err="1"/>
+              <a:t>christmas</a:t>
+            </a:r>
+            <a:r>
+              <a:rPr lang="nb-NO" dirty="0"/>
+              <a:t>, and </a:t>
+            </a:r>
+            <a:r>
+              <a:rPr lang="nb-NO" dirty="0" err="1"/>
+              <a:t>hopefully</a:t>
+            </a:r>
+            <a:r>
+              <a:rPr lang="nb-NO" dirty="0"/>
+              <a:t> have </a:t>
+            </a:r>
+            <a:r>
+              <a:rPr lang="nb-NO" dirty="0" err="1"/>
+              <a:t>some</a:t>
+            </a:r>
+            <a:r>
+              <a:rPr lang="nb-NO" dirty="0"/>
+              <a:t> </a:t>
+            </a:r>
+            <a:r>
+              <a:rPr lang="nb-NO" dirty="0" err="1"/>
+              <a:t>nice</a:t>
+            </a:r>
+            <a:r>
+              <a:rPr lang="nb-NO" dirty="0"/>
+              <a:t> </a:t>
+            </a:r>
+            <a:r>
+              <a:rPr lang="nb-NO" dirty="0" err="1"/>
+              <a:t>model</a:t>
+            </a:r>
+            <a:r>
+              <a:rPr lang="nb-NO" dirty="0"/>
+              <a:t> </a:t>
+            </a:r>
+            <a:r>
+              <a:rPr lang="nb-NO" dirty="0" err="1"/>
+              <a:t>results</a:t>
+            </a:r>
+            <a:r>
+              <a:rPr lang="nb-NO" dirty="0"/>
+              <a:t> for </a:t>
+            </a:r>
+            <a:r>
+              <a:rPr lang="nb-NO" dirty="0" err="1"/>
+              <a:t>January</a:t>
+            </a:r>
+            <a:endParaRPr lang="nb-NO" dirty="0"/>
+          </a:p>
+          <a:p>
+            <a:endParaRPr lang="nb-NO" dirty="0"/>
+          </a:p>
+          <a:p>
+            <a:r>
+              <a:rPr lang="nb-NO" dirty="0"/>
+              <a:t>My last </a:t>
+            </a:r>
+            <a:r>
+              <a:rPr lang="nb-NO" dirty="0" err="1"/>
+              <a:t>day</a:t>
+            </a:r>
+            <a:r>
+              <a:rPr lang="nb-NO" dirty="0"/>
+              <a:t> </a:t>
+            </a:r>
+            <a:r>
+              <a:rPr lang="nb-NO" dirty="0" err="1"/>
+              <a:t>of</a:t>
+            </a:r>
+            <a:r>
+              <a:rPr lang="nb-NO" dirty="0"/>
+              <a:t> </a:t>
+            </a:r>
+            <a:r>
+              <a:rPr lang="nb-NO" dirty="0" err="1"/>
+              <a:t>the</a:t>
+            </a:r>
+            <a:r>
+              <a:rPr lang="nb-NO" dirty="0"/>
+              <a:t> semester </a:t>
+            </a:r>
+            <a:r>
+              <a:rPr lang="nb-NO" dirty="0" err="1"/>
+              <a:t>will</a:t>
+            </a:r>
+            <a:r>
+              <a:rPr lang="nb-NO" dirty="0"/>
+              <a:t> be 19th </a:t>
+            </a:r>
+            <a:r>
+              <a:rPr lang="nb-NO" dirty="0" err="1"/>
+              <a:t>of</a:t>
+            </a:r>
+            <a:r>
+              <a:rPr lang="nb-NO" dirty="0"/>
+              <a:t> </a:t>
+            </a:r>
+            <a:r>
+              <a:rPr lang="nb-NO" dirty="0" err="1"/>
+              <a:t>December</a:t>
+            </a:r>
+            <a:endParaRPr lang="nb-NO" dirty="0"/>
+          </a:p>
+          <a:p>
+            <a:endParaRPr lang="nb-NO" dirty="0"/>
+          </a:p>
+          <a:p>
+            <a:r>
+              <a:rPr lang="nb-NO" dirty="0"/>
+              <a:t>Last general </a:t>
+            </a:r>
+            <a:r>
+              <a:rPr lang="nb-NO" dirty="0" err="1"/>
+              <a:t>meeting</a:t>
+            </a:r>
+            <a:r>
+              <a:rPr lang="nb-NO" dirty="0"/>
+              <a:t> for </a:t>
+            </a:r>
+            <a:r>
+              <a:rPr lang="nb-NO" dirty="0" err="1"/>
+              <a:t>the</a:t>
+            </a:r>
+            <a:r>
+              <a:rPr lang="nb-NO" dirty="0"/>
+              <a:t> semester </a:t>
+            </a:r>
+            <a:r>
+              <a:rPr lang="nb-NO" dirty="0" err="1"/>
+              <a:t>will</a:t>
+            </a:r>
+            <a:r>
+              <a:rPr lang="nb-NO" dirty="0"/>
+              <a:t> </a:t>
+            </a:r>
+            <a:r>
+              <a:rPr lang="nb-NO" dirty="0" err="1"/>
+              <a:t>then</a:t>
+            </a:r>
+            <a:r>
+              <a:rPr lang="nb-NO" dirty="0"/>
+              <a:t> be </a:t>
+            </a:r>
+            <a:r>
+              <a:rPr lang="nb-NO" dirty="0" err="1"/>
+              <a:t>on</a:t>
+            </a:r>
+            <a:r>
+              <a:rPr lang="nb-NO" dirty="0"/>
+              <a:t> </a:t>
+            </a:r>
+            <a:r>
+              <a:rPr lang="nb-NO" sz="3600" b="1" dirty="0"/>
+              <a:t>1.12.2022</a:t>
+            </a:r>
+            <a:endParaRPr lang="en-GB" b="1" dirty="0"/>
+          </a:p>
+        </p:txBody>
+      </p:sp>
+    </p:spTree>
+    <p:extLst>
+      <p:ext uri="{BB962C8B-B14F-4D97-AF65-F5344CB8AC3E}">
+        <p14:creationId xmlns:p14="http://schemas.microsoft.com/office/powerpoint/2010/main" val="1108506506"/>
+      </p:ext>
+    </p:extLst>
+  </p:cSld>
+  <p:clrMapOvr>
+    <a:masterClrMapping/>
+  </p:clrMapOvr>
+</p:sld>
+</file>
+
+<file path=ppt/slides/slide15.xml><?xml version="1.0" encoding="utf-8"?>
+<p:sld xmlns:a="http://schemas.openxmlformats.org/drawingml/2006/main" xmlns:r="http://schemas.openxmlformats.org/officeDocument/2006/relationships" xmlns:p="http://schemas.openxmlformats.org/presentationml/2006/main">
+  <p:cSld>
+    <p:spTree>
+      <p:nvGrpSpPr>
+        <p:cNvPr id="1" name=""/>
+        <p:cNvGrpSpPr/>
+        <p:nvPr/>
+      </p:nvGrpSpPr>
+      <p:grpSpPr>
+        <a:xfrm>
+          <a:off x="0" y="0"/>
+          <a:ext cx="0" cy="0"/>
+          <a:chOff x="0" y="0"/>
+          <a:chExt cx="0" cy="0"/>
+        </a:xfrm>
+      </p:grpSpPr>
+      <p:sp>
+        <p:nvSpPr>
+          <p:cNvPr id="2" name="Title 1">
+            <a:extLst>
+              <a:ext uri="{FF2B5EF4-FFF2-40B4-BE49-F238E27FC236}">
+                <a16:creationId xmlns:a16="http://schemas.microsoft.com/office/drawing/2014/main" id="{3B148894-1FBF-40C6-84CE-5E69EED8F2C0}"/>
+              </a:ext>
+            </a:extLst>
+          </p:cNvPr>
+          <p:cNvSpPr>
+            <a:spLocks noGrp="1"/>
+          </p:cNvSpPr>
+          <p:nvPr>
+            <p:ph type="title"/>
+          </p:nvPr>
+        </p:nvSpPr>
+        <p:spPr>
+          <a:xfrm>
+            <a:off x="709612" y="2599901"/>
+            <a:ext cx="10772775" cy="1658198"/>
+          </a:xfrm>
+        </p:spPr>
+        <p:txBody>
+          <a:bodyPr/>
+          <a:lstStyle/>
+          <a:p>
+            <a:r>
+              <a:rPr lang="nb-NO" dirty="0" err="1">
+                <a:solidFill>
+                  <a:schemeClr val="tx1"/>
+                </a:solidFill>
+              </a:rPr>
+              <a:t>When</a:t>
+            </a:r>
+            <a:r>
+              <a:rPr lang="nb-NO" dirty="0">
+                <a:solidFill>
+                  <a:schemeClr val="tx1"/>
+                </a:solidFill>
+              </a:rPr>
+              <a:t> to start up </a:t>
+            </a:r>
+            <a:r>
+              <a:rPr lang="nb-NO" dirty="0" err="1">
+                <a:solidFill>
+                  <a:schemeClr val="tx1"/>
+                </a:solidFill>
+              </a:rPr>
+              <a:t>next</a:t>
+            </a:r>
+            <a:r>
+              <a:rPr lang="nb-NO" dirty="0">
+                <a:solidFill>
+                  <a:schemeClr val="tx1"/>
+                </a:solidFill>
+              </a:rPr>
+              <a:t> semester?</a:t>
+            </a:r>
+            <a:endParaRPr lang="en-GB" dirty="0">
+              <a:solidFill>
+                <a:schemeClr val="tx1"/>
+              </a:solidFill>
+            </a:endParaRPr>
+          </a:p>
+        </p:txBody>
+      </p:sp>
+    </p:spTree>
+    <p:extLst>
+      <p:ext uri="{BB962C8B-B14F-4D97-AF65-F5344CB8AC3E}">
+        <p14:creationId xmlns:p14="http://schemas.microsoft.com/office/powerpoint/2010/main" val="3685417218"/>
+      </p:ext>
+    </p:extLst>
+  </p:cSld>
+  <p:clrMapOvr>
+    <a:masterClrMapping/>
+  </p:clrMapOvr>
+</p:sld>
+</file>
+
+<file path=ppt/slides/slide2.xml><?xml version="1.0" encoding="utf-8"?>
+<p:sld xmlns:a="http://schemas.openxmlformats.org/drawingml/2006/main" xmlns:r="http://schemas.openxmlformats.org/officeDocument/2006/relationships" xmlns:p="http://schemas.openxmlformats.org/presentationml/2006/main">
+  <p:cSld>
+    <p:spTree>
+      <p:nvGrpSpPr>
+        <p:cNvPr id="1" name=""/>
+        <p:cNvGrpSpPr/>
+        <p:nvPr/>
+      </p:nvGrpSpPr>
+      <p:grpSpPr>
+        <a:xfrm>
+          <a:off x="0" y="0"/>
+          <a:ext cx="0" cy="0"/>
+          <a:chOff x="0" y="0"/>
+          <a:chExt cx="0" cy="0"/>
+        </a:xfrm>
+      </p:grpSpPr>
+      <p:sp>
+        <p:nvSpPr>
+          <p:cNvPr id="2" name="Title 1">
+            <a:extLst>
+              <a:ext uri="{FF2B5EF4-FFF2-40B4-BE49-F238E27FC236}">
+                <a16:creationId xmlns:a16="http://schemas.microsoft.com/office/drawing/2014/main" id="{BC0DA141-5424-46C4-ACB1-4974D042573C}"/>
+              </a:ext>
+            </a:extLst>
+          </p:cNvPr>
+          <p:cNvSpPr>
+            <a:spLocks noGrp="1"/>
+          </p:cNvSpPr>
+          <p:nvPr>
+            <p:ph type="title"/>
+          </p:nvPr>
+        </p:nvSpPr>
+        <p:spPr/>
+        <p:txBody>
+          <a:bodyPr/>
+          <a:lstStyle/>
+          <a:p>
+            <a:r>
+              <a:rPr lang="nb-NO" dirty="0">
+                <a:solidFill>
+                  <a:schemeClr val="tx1"/>
+                </a:solidFill>
+              </a:rPr>
+              <a:t>Contents/</a:t>
+            </a:r>
+            <a:r>
+              <a:rPr lang="nb-NO" dirty="0" err="1">
+                <a:solidFill>
+                  <a:schemeClr val="tx1"/>
+                </a:solidFill>
+              </a:rPr>
+              <a:t>motivations</a:t>
+            </a:r>
+            <a:endParaRPr lang="en-GB" dirty="0">
+              <a:solidFill>
+                <a:schemeClr val="tx1"/>
+              </a:solidFill>
+            </a:endParaRPr>
+          </a:p>
+        </p:txBody>
+      </p:sp>
+      <p:sp>
+        <p:nvSpPr>
+          <p:cNvPr id="3" name="Content Placeholder 2">
+            <a:extLst>
+              <a:ext uri="{FF2B5EF4-FFF2-40B4-BE49-F238E27FC236}">
+                <a16:creationId xmlns:a16="http://schemas.microsoft.com/office/drawing/2014/main" id="{6F2B10CC-4B8C-41C3-A74A-91827D205A50}"/>
+              </a:ext>
+            </a:extLst>
+          </p:cNvPr>
+          <p:cNvSpPr>
+            <a:spLocks noGrp="1"/>
+          </p:cNvSpPr>
+          <p:nvPr>
+            <p:ph idx="1"/>
+          </p:nvPr>
+        </p:nvSpPr>
+        <p:spPr/>
+        <p:txBody>
+          <a:bodyPr/>
+          <a:lstStyle/>
+          <a:p>
+            <a:r>
+              <a:rPr lang="nb-NO" dirty="0"/>
+              <a:t>Second to last </a:t>
+            </a:r>
+            <a:r>
+              <a:rPr lang="nb-NO" dirty="0" err="1"/>
+              <a:t>meeting</a:t>
+            </a:r>
+            <a:r>
+              <a:rPr lang="nb-NO" dirty="0"/>
+              <a:t> </a:t>
+            </a:r>
+            <a:r>
+              <a:rPr lang="nb-NO" dirty="0" err="1"/>
+              <a:t>of</a:t>
+            </a:r>
+            <a:r>
+              <a:rPr lang="nb-NO" dirty="0"/>
+              <a:t> </a:t>
+            </a:r>
+            <a:r>
+              <a:rPr lang="nb-NO" dirty="0" err="1"/>
+              <a:t>the</a:t>
+            </a:r>
+            <a:r>
+              <a:rPr lang="nb-NO" dirty="0"/>
+              <a:t> semester</a:t>
+            </a:r>
+          </a:p>
+          <a:p>
+            <a:r>
+              <a:rPr lang="nb-NO" dirty="0"/>
+              <a:t>Status </a:t>
+            </a:r>
+            <a:r>
+              <a:rPr lang="nb-NO" dirty="0" err="1"/>
+              <a:t>update</a:t>
+            </a:r>
+            <a:endParaRPr lang="nb-NO" dirty="0"/>
+          </a:p>
+          <a:p>
+            <a:endParaRPr lang="en-GB" dirty="0"/>
+          </a:p>
+        </p:txBody>
+      </p:sp>
+    </p:spTree>
+    <p:extLst>
+      <p:ext uri="{BB962C8B-B14F-4D97-AF65-F5344CB8AC3E}">
+        <p14:creationId xmlns:p14="http://schemas.microsoft.com/office/powerpoint/2010/main" val="2505827935"/>
+      </p:ext>
+    </p:extLst>
+  </p:cSld>
+  <p:clrMapOvr>
+    <a:masterClrMapping/>
+  </p:clrMapOvr>
+</p:sld>
+</file>
+
+<file path=ppt/slides/slide3.xml><?xml version="1.0" encoding="utf-8"?>
+<p:sld xmlns:a="http://schemas.openxmlformats.org/drawingml/2006/main" xmlns:r="http://schemas.openxmlformats.org/officeDocument/2006/relationships" xmlns:p="http://schemas.openxmlformats.org/presentationml/2006/main">
+  <p:cSld>
+    <p:spTree>
+      <p:nvGrpSpPr>
+        <p:cNvPr id="1" name=""/>
+        <p:cNvGrpSpPr/>
+        <p:nvPr/>
+      </p:nvGrpSpPr>
+      <p:grpSpPr>
+        <a:xfrm>
+          <a:off x="0" y="0"/>
+          <a:ext cx="0" cy="0"/>
+          <a:chOff x="0" y="0"/>
+          <a:chExt cx="0" cy="0"/>
+        </a:xfrm>
+      </p:grpSpPr>
+      <p:sp>
+        <p:nvSpPr>
+          <p:cNvPr id="2" name="Title 1">
+            <a:extLst>
+              <a:ext uri="{FF2B5EF4-FFF2-40B4-BE49-F238E27FC236}">
+                <a16:creationId xmlns:a16="http://schemas.microsoft.com/office/drawing/2014/main" id="{E7B5AC05-0A0D-4605-B4E2-1C92DEEB4F3C}"/>
+              </a:ext>
+            </a:extLst>
+          </p:cNvPr>
+          <p:cNvSpPr>
+            <a:spLocks noGrp="1"/>
+          </p:cNvSpPr>
+          <p:nvPr>
+            <p:ph type="title"/>
+          </p:nvPr>
+        </p:nvSpPr>
+        <p:spPr/>
+        <p:txBody>
+          <a:bodyPr/>
+          <a:lstStyle/>
+          <a:p>
+            <a:r>
+              <a:rPr lang="nb-NO" dirty="0">
+                <a:solidFill>
+                  <a:schemeClr val="tx1"/>
+                </a:solidFill>
+              </a:rPr>
+              <a:t>Progress</a:t>
+            </a:r>
+            <a:endParaRPr lang="en-GB" dirty="0">
+              <a:solidFill>
+                <a:schemeClr val="tx1"/>
+              </a:solidFill>
+            </a:endParaRPr>
+          </a:p>
+        </p:txBody>
+      </p:sp>
+      <p:sp>
+        <p:nvSpPr>
+          <p:cNvPr id="3" name="Content Placeholder 2">
+            <a:extLst>
+              <a:ext uri="{FF2B5EF4-FFF2-40B4-BE49-F238E27FC236}">
+                <a16:creationId xmlns:a16="http://schemas.microsoft.com/office/drawing/2014/main" id="{F8AF6BE8-0F5C-47CF-8DE1-30743428E43D}"/>
+              </a:ext>
+            </a:extLst>
+          </p:cNvPr>
+          <p:cNvSpPr>
+            <a:spLocks noGrp="1"/>
+          </p:cNvSpPr>
+          <p:nvPr>
+            <p:ph idx="1"/>
+          </p:nvPr>
+        </p:nvSpPr>
+        <p:spPr/>
+        <p:txBody>
+          <a:bodyPr/>
+          <a:lstStyle/>
+          <a:p>
+            <a:r>
+              <a:rPr lang="nb-NO" dirty="0"/>
+              <a:t>~1000 lines </a:t>
+            </a:r>
+            <a:r>
+              <a:rPr lang="nb-NO" dirty="0" err="1"/>
+              <a:t>of</a:t>
+            </a:r>
+            <a:r>
+              <a:rPr lang="nb-NO" dirty="0"/>
+              <a:t> </a:t>
+            </a:r>
+            <a:r>
+              <a:rPr lang="nb-NO" dirty="0" err="1"/>
+              <a:t>code</a:t>
+            </a:r>
+            <a:r>
+              <a:rPr lang="nb-NO" dirty="0"/>
+              <a:t> has </a:t>
+            </a:r>
+            <a:r>
+              <a:rPr lang="nb-NO" dirty="0" err="1"/>
+              <a:t>been</a:t>
+            </a:r>
+            <a:r>
+              <a:rPr lang="nb-NO" dirty="0"/>
+              <a:t> </a:t>
+            </a:r>
+            <a:r>
+              <a:rPr lang="nb-NO" dirty="0" err="1"/>
+              <a:t>written</a:t>
+            </a:r>
+            <a:endParaRPr lang="nb-NO" dirty="0"/>
+          </a:p>
+          <a:p>
+            <a:r>
+              <a:rPr lang="en-GB" dirty="0"/>
+              <a:t>Many model runs have been done to test the model</a:t>
+            </a:r>
+          </a:p>
+          <a:p>
+            <a:pPr>
+              <a:buFont typeface="Wingdings" panose="05000000000000000000" pitchFamily="2" charset="2"/>
+              <a:buChar char="§"/>
+            </a:pPr>
+            <a:r>
+              <a:rPr lang="en-GB" dirty="0"/>
+              <a:t> </a:t>
+            </a:r>
+            <a:r>
+              <a:rPr lang="en-GB" dirty="0" err="1"/>
+              <a:t>Optuna</a:t>
+            </a:r>
+            <a:r>
+              <a:rPr lang="en-GB" dirty="0"/>
+              <a:t> is implemented</a:t>
+            </a:r>
+          </a:p>
+          <a:p>
+            <a:pPr>
+              <a:buFont typeface="Wingdings" panose="05000000000000000000" pitchFamily="2" charset="2"/>
+              <a:buChar char="§"/>
+            </a:pPr>
+            <a:r>
+              <a:rPr lang="en-GB" dirty="0"/>
+              <a:t> Multiple outputs have been implemented</a:t>
+            </a:r>
+          </a:p>
+          <a:p>
+            <a:pPr>
+              <a:buFont typeface="Wingdings" panose="05000000000000000000" pitchFamily="2" charset="2"/>
+              <a:buChar char="§"/>
+            </a:pPr>
+            <a:r>
+              <a:rPr lang="en-GB" dirty="0"/>
+              <a:t> Automatic model naming schemes and storing configs</a:t>
+            </a:r>
+          </a:p>
+          <a:p>
+            <a:pPr>
+              <a:buFont typeface="Wingdings" panose="05000000000000000000" pitchFamily="2" charset="2"/>
+              <a:buChar char="§"/>
+            </a:pPr>
+            <a:r>
+              <a:rPr lang="en-GB" dirty="0"/>
+              <a:t> Model overfits well to unprocessed seismic data</a:t>
+            </a:r>
+          </a:p>
+        </p:txBody>
+      </p:sp>
+    </p:spTree>
+    <p:extLst>
+      <p:ext uri="{BB962C8B-B14F-4D97-AF65-F5344CB8AC3E}">
+        <p14:creationId xmlns:p14="http://schemas.microsoft.com/office/powerpoint/2010/main" val="4189716457"/>
+      </p:ext>
+    </p:extLst>
+  </p:cSld>
+  <p:clrMapOvr>
+    <a:masterClrMapping/>
+  </p:clrMapOvr>
+</p:sld>
+</file>
+
+<file path=ppt/slides/slide4.xml><?xml version="1.0" encoding="utf-8"?>
+<p:sld xmlns:a="http://schemas.openxmlformats.org/drawingml/2006/main" xmlns:r="http://schemas.openxmlformats.org/officeDocument/2006/relationships" xmlns:p="http://schemas.openxmlformats.org/presentationml/2006/main">
+  <p:cSld>
+    <p:spTree>
+      <p:nvGrpSpPr>
+        <p:cNvPr id="1" name=""/>
+        <p:cNvGrpSpPr/>
+        <p:nvPr/>
+      </p:nvGrpSpPr>
+      <p:grpSpPr>
+        <a:xfrm>
+          <a:off x="0" y="0"/>
+          <a:ext cx="0" cy="0"/>
+          <a:chOff x="0" y="0"/>
+          <a:chExt cx="0" cy="0"/>
+        </a:xfrm>
+      </p:grpSpPr>
+      <p:sp>
+        <p:nvSpPr>
+          <p:cNvPr id="2" name="Title 1">
+            <a:extLst>
+              <a:ext uri="{FF2B5EF4-FFF2-40B4-BE49-F238E27FC236}">
+                <a16:creationId xmlns:a16="http://schemas.microsoft.com/office/drawing/2014/main" id="{1AAC4FEF-EFFB-4F0D-8ACE-07E88FE402DF}"/>
+              </a:ext>
+            </a:extLst>
+          </p:cNvPr>
+          <p:cNvSpPr>
+            <a:spLocks noGrp="1"/>
+          </p:cNvSpPr>
+          <p:nvPr>
+            <p:ph type="title"/>
+          </p:nvPr>
+        </p:nvSpPr>
+        <p:spPr/>
+        <p:txBody>
+          <a:bodyPr/>
+          <a:lstStyle/>
+          <a:p>
+            <a:r>
+              <a:rPr lang="nb-NO" dirty="0">
+                <a:solidFill>
+                  <a:schemeClr val="tx1"/>
+                </a:solidFill>
+              </a:rPr>
+              <a:t>Architectures</a:t>
+            </a:r>
+            <a:endParaRPr lang="en-GB" dirty="0">
+              <a:solidFill>
+                <a:schemeClr val="tx1"/>
+              </a:solidFill>
+            </a:endParaRPr>
+          </a:p>
+        </p:txBody>
+      </p:sp>
+      <p:sp>
+        <p:nvSpPr>
+          <p:cNvPr id="3" name="Content Placeholder 2">
+            <a:extLst>
+              <a:ext uri="{FF2B5EF4-FFF2-40B4-BE49-F238E27FC236}">
+                <a16:creationId xmlns:a16="http://schemas.microsoft.com/office/drawing/2014/main" id="{C253D301-4793-4132-9D99-30D62BC6DE4E}"/>
+              </a:ext>
+            </a:extLst>
+          </p:cNvPr>
+          <p:cNvSpPr>
+            <a:spLocks noGrp="1"/>
+          </p:cNvSpPr>
+          <p:nvPr>
+            <p:ph idx="1"/>
+          </p:nvPr>
+        </p:nvSpPr>
+        <p:spPr/>
+        <p:txBody>
+          <a:bodyPr/>
+          <a:lstStyle/>
+          <a:p>
+            <a:r>
+              <a:rPr lang="nb-NO" dirty="0"/>
+              <a:t>I </a:t>
+            </a:r>
+            <a:r>
+              <a:rPr lang="nb-NO" dirty="0" err="1"/>
+              <a:t>think</a:t>
+            </a:r>
+            <a:r>
+              <a:rPr lang="nb-NO" dirty="0"/>
+              <a:t> it is </a:t>
+            </a:r>
+            <a:r>
+              <a:rPr lang="nb-NO" dirty="0" err="1"/>
+              <a:t>reasonable</a:t>
+            </a:r>
+            <a:r>
+              <a:rPr lang="nb-NO" dirty="0"/>
+              <a:t> to </a:t>
+            </a:r>
+            <a:r>
+              <a:rPr lang="nb-NO" dirty="0" err="1"/>
+              <a:t>only</a:t>
+            </a:r>
+            <a:r>
+              <a:rPr lang="nb-NO" dirty="0"/>
+              <a:t> </a:t>
+            </a:r>
+            <a:r>
+              <a:rPr lang="nb-NO" dirty="0" err="1"/>
+              <a:t>focus</a:t>
+            </a:r>
+            <a:r>
+              <a:rPr lang="nb-NO" dirty="0"/>
+              <a:t> </a:t>
+            </a:r>
+            <a:r>
+              <a:rPr lang="nb-NO" dirty="0" err="1"/>
+              <a:t>on</a:t>
+            </a:r>
+            <a:r>
+              <a:rPr lang="nb-NO" dirty="0"/>
+              <a:t> TCN</a:t>
+            </a:r>
+          </a:p>
+          <a:p>
+            <a:endParaRPr lang="nb-NO" dirty="0"/>
+          </a:p>
+          <a:p>
+            <a:r>
+              <a:rPr lang="nb-NO" dirty="0" err="1"/>
+              <a:t>Possible</a:t>
+            </a:r>
+            <a:r>
+              <a:rPr lang="nb-NO" dirty="0"/>
+              <a:t> to make </a:t>
+            </a:r>
+            <a:r>
+              <a:rPr lang="nb-NO" dirty="0" err="1"/>
+              <a:t>reference</a:t>
+            </a:r>
+            <a:r>
+              <a:rPr lang="nb-NO" dirty="0"/>
+              <a:t> to </a:t>
+            </a:r>
+            <a:r>
+              <a:rPr lang="nb-NO" dirty="0" err="1"/>
+              <a:t>publications</a:t>
+            </a:r>
+            <a:r>
+              <a:rPr lang="nb-NO" dirty="0"/>
+              <a:t> by Mustafa</a:t>
+            </a:r>
+          </a:p>
+          <a:p>
+            <a:endParaRPr lang="nb-NO" dirty="0"/>
+          </a:p>
+          <a:p>
+            <a:r>
+              <a:rPr lang="nb-NO" dirty="0"/>
+              <a:t>LSTM; </a:t>
+            </a:r>
+            <a:r>
+              <a:rPr lang="nb-NO" dirty="0" err="1"/>
+              <a:t>audio</a:t>
+            </a:r>
+            <a:r>
+              <a:rPr lang="nb-NO" dirty="0"/>
+              <a:t>, CNN; image</a:t>
+            </a:r>
+          </a:p>
+          <a:p>
+            <a:r>
+              <a:rPr lang="nb-NO" dirty="0" err="1"/>
+              <a:t>Seismic</a:t>
+            </a:r>
+            <a:r>
+              <a:rPr lang="nb-NO" dirty="0"/>
+              <a:t> === </a:t>
+            </a:r>
+            <a:r>
+              <a:rPr lang="nb-NO" dirty="0" err="1"/>
+              <a:t>Audio</a:t>
+            </a:r>
+            <a:r>
+              <a:rPr lang="nb-NO" dirty="0"/>
+              <a:t> image</a:t>
+            </a:r>
+            <a:endParaRPr lang="en-GB" dirty="0"/>
+          </a:p>
+        </p:txBody>
+      </p:sp>
+    </p:spTree>
+    <p:extLst>
+      <p:ext uri="{BB962C8B-B14F-4D97-AF65-F5344CB8AC3E}">
+        <p14:creationId xmlns:p14="http://schemas.microsoft.com/office/powerpoint/2010/main" val="4237242111"/>
+      </p:ext>
+    </p:extLst>
+  </p:cSld>
+  <p:clrMapOvr>
+    <a:masterClrMapping/>
+  </p:clrMapOvr>
+</p:sld>
+</file>
+
+<file path=ppt/slides/slide5.xml><?xml version="1.0" encoding="utf-8"?>
+<p:sld xmlns:a="http://schemas.openxmlformats.org/drawingml/2006/main" xmlns:r="http://schemas.openxmlformats.org/officeDocument/2006/relationships" xmlns:p="http://schemas.openxmlformats.org/presentationml/2006/main">
+  <p:cSld>
+    <p:spTree>
+      <p:nvGrpSpPr>
+        <p:cNvPr id="1" name=""/>
+        <p:cNvGrpSpPr/>
+        <p:nvPr/>
+      </p:nvGrpSpPr>
+      <p:grpSpPr>
+        <a:xfrm>
+          <a:off x="0" y="0"/>
+          <a:ext cx="0" cy="0"/>
+          <a:chOff x="0" y="0"/>
+          <a:chExt cx="0" cy="0"/>
+        </a:xfrm>
+      </p:grpSpPr>
+      <p:sp>
+        <p:nvSpPr>
+          <p:cNvPr id="2" name="Title 1">
+            <a:extLst>
+              <a:ext uri="{FF2B5EF4-FFF2-40B4-BE49-F238E27FC236}">
+                <a16:creationId xmlns:a16="http://schemas.microsoft.com/office/drawing/2014/main" id="{14E5B637-EFB1-485A-93FD-B96132C74F77}"/>
+              </a:ext>
+            </a:extLst>
+          </p:cNvPr>
+          <p:cNvSpPr>
+            <a:spLocks noGrp="1"/>
+          </p:cNvSpPr>
+          <p:nvPr>
+            <p:ph type="title"/>
+          </p:nvPr>
+        </p:nvSpPr>
+        <p:spPr/>
+        <p:txBody>
+          <a:bodyPr/>
+          <a:lstStyle/>
+          <a:p>
+            <a:r>
+              <a:rPr lang="nb-NO" dirty="0">
+                <a:solidFill>
+                  <a:schemeClr val="tx1"/>
+                </a:solidFill>
+              </a:rPr>
+              <a:t>Folder </a:t>
+            </a:r>
+            <a:r>
+              <a:rPr lang="nb-NO" dirty="0" err="1">
+                <a:solidFill>
+                  <a:schemeClr val="tx1"/>
+                </a:solidFill>
+              </a:rPr>
+              <a:t>structure</a:t>
+            </a:r>
+            <a:endParaRPr lang="en-GB" dirty="0">
+              <a:solidFill>
+                <a:schemeClr val="tx1"/>
+              </a:solidFill>
+            </a:endParaRPr>
+          </a:p>
+        </p:txBody>
+      </p:sp>
+      <p:sp>
+        <p:nvSpPr>
+          <p:cNvPr id="3" name="Content Placeholder 2">
+            <a:extLst>
+              <a:ext uri="{FF2B5EF4-FFF2-40B4-BE49-F238E27FC236}">
+                <a16:creationId xmlns:a16="http://schemas.microsoft.com/office/drawing/2014/main" id="{970C01B7-A266-4D0B-9A43-EEEEC42279A0}"/>
+              </a:ext>
+            </a:extLst>
+          </p:cNvPr>
+          <p:cNvSpPr>
+            <a:spLocks noGrp="1"/>
+          </p:cNvSpPr>
+          <p:nvPr>
+            <p:ph idx="1"/>
+          </p:nvPr>
+        </p:nvSpPr>
+        <p:spPr/>
+        <p:txBody>
+          <a:bodyPr/>
+          <a:lstStyle/>
+          <a:p>
+            <a:r>
+              <a:rPr lang="nb-NO" dirty="0" err="1"/>
+              <a:t>Tree</a:t>
+            </a:r>
+            <a:r>
+              <a:rPr lang="nb-NO" dirty="0"/>
+              <a:t> letters </a:t>
+            </a:r>
+            <a:r>
+              <a:rPr lang="nb-NO" dirty="0" err="1"/>
+              <a:t>denoting</a:t>
+            </a:r>
+            <a:r>
+              <a:rPr lang="nb-NO" dirty="0"/>
+              <a:t> </a:t>
+            </a:r>
+            <a:r>
+              <a:rPr lang="nb-NO" b="1" dirty="0" err="1"/>
+              <a:t>group</a:t>
+            </a:r>
+            <a:r>
+              <a:rPr lang="nb-NO" b="1" dirty="0"/>
+              <a:t> </a:t>
+            </a:r>
+            <a:r>
+              <a:rPr lang="nb-NO" b="1" dirty="0" err="1"/>
+              <a:t>name</a:t>
+            </a:r>
+            <a:endParaRPr lang="nb-NO" b="1" dirty="0"/>
+          </a:p>
+          <a:p>
+            <a:r>
+              <a:rPr lang="nb-NO" dirty="0"/>
+              <a:t>Total 26^3 = 17 576 combinations</a:t>
+            </a:r>
+          </a:p>
+          <a:p>
+            <a:endParaRPr lang="nb-NO" dirty="0"/>
+          </a:p>
+          <a:p>
+            <a:r>
+              <a:rPr lang="nb-NO" dirty="0"/>
+              <a:t>Models </a:t>
+            </a:r>
+            <a:r>
+              <a:rPr lang="nb-NO" dirty="0" err="1"/>
+              <a:t>are</a:t>
+            </a:r>
+            <a:r>
+              <a:rPr lang="nb-NO" dirty="0"/>
+              <a:t> given a </a:t>
+            </a:r>
+            <a:r>
+              <a:rPr lang="nb-NO" dirty="0" err="1"/>
+              <a:t>number</a:t>
+            </a:r>
+            <a:r>
+              <a:rPr lang="nb-NO" dirty="0"/>
+              <a:t> </a:t>
+            </a:r>
+            <a:r>
+              <a:rPr lang="nb-NO" dirty="0" err="1"/>
+              <a:t>starting</a:t>
+            </a:r>
+            <a:r>
+              <a:rPr lang="nb-NO" dirty="0"/>
+              <a:t> at 0</a:t>
+            </a:r>
+          </a:p>
+          <a:p>
+            <a:endParaRPr lang="nb-NO" dirty="0"/>
+          </a:p>
+          <a:p>
+            <a:r>
+              <a:rPr lang="nb-NO" dirty="0"/>
+              <a:t>A </a:t>
+            </a:r>
+            <a:r>
+              <a:rPr lang="nb-NO" dirty="0" err="1"/>
+              <a:t>model</a:t>
+            </a:r>
+            <a:r>
+              <a:rPr lang="nb-NO" dirty="0"/>
+              <a:t> </a:t>
+            </a:r>
+            <a:r>
+              <a:rPr lang="nb-NO" dirty="0" err="1"/>
+              <a:t>name</a:t>
+            </a:r>
+            <a:r>
+              <a:rPr lang="nb-NO" dirty="0"/>
+              <a:t> </a:t>
+            </a:r>
+            <a:r>
+              <a:rPr lang="nb-NO" dirty="0" err="1"/>
+              <a:t>will</a:t>
+            </a:r>
+            <a:r>
+              <a:rPr lang="nb-NO" dirty="0"/>
+              <a:t> </a:t>
+            </a:r>
+            <a:r>
+              <a:rPr lang="nb-NO" dirty="0" err="1"/>
+              <a:t>then</a:t>
+            </a:r>
+            <a:r>
+              <a:rPr lang="nb-NO" dirty="0"/>
+              <a:t> be </a:t>
+            </a:r>
+            <a:r>
+              <a:rPr lang="nb-NO" dirty="0" err="1"/>
+              <a:t>Groupname</a:t>
+            </a:r>
+            <a:r>
+              <a:rPr lang="nb-NO" dirty="0"/>
+              <a:t> / </a:t>
+            </a:r>
+            <a:r>
+              <a:rPr lang="nb-NO" dirty="0" err="1"/>
+              <a:t>Modelnumber</a:t>
+            </a:r>
+            <a:endParaRPr lang="en-GB" dirty="0"/>
+          </a:p>
+        </p:txBody>
+      </p:sp>
+      <p:pic>
+        <p:nvPicPr>
+          <p:cNvPr id="9" name="Picture 8">
+            <a:extLst>
+              <a:ext uri="{FF2B5EF4-FFF2-40B4-BE49-F238E27FC236}">
+                <a16:creationId xmlns:a16="http://schemas.microsoft.com/office/drawing/2014/main" id="{1446C5D3-5B1A-481D-A554-0D46DC8EF574}"/>
+              </a:ext>
+            </a:extLst>
+          </p:cNvPr>
+          <p:cNvPicPr>
+            <a:picLocks noChangeAspect="1"/>
+          </p:cNvPicPr>
+          <p:nvPr/>
+        </p:nvPicPr>
+        <p:blipFill>
+          <a:blip r:embed="rId2"/>
+          <a:stretch>
+            <a:fillRect/>
+          </a:stretch>
+        </p:blipFill>
+        <p:spPr>
+          <a:xfrm>
+            <a:off x="8236491" y="1852612"/>
+            <a:ext cx="3695700" cy="3152775"/>
+          </a:xfrm>
+          <a:prstGeom prst="rect">
+            <a:avLst/>
+          </a:prstGeom>
+        </p:spPr>
+      </p:pic>
+    </p:spTree>
+    <p:extLst>
+      <p:ext uri="{BB962C8B-B14F-4D97-AF65-F5344CB8AC3E}">
+        <p14:creationId xmlns:p14="http://schemas.microsoft.com/office/powerpoint/2010/main" val="873877308"/>
+      </p:ext>
+    </p:extLst>
+  </p:cSld>
+  <p:clrMapOvr>
+    <a:masterClrMapping/>
+  </p:clrMapOvr>
+</p:sld>
+</file>
+
+<file path=ppt/slides/slide6.xml><?xml version="1.0" encoding="utf-8"?>
+<p:sld xmlns:a="http://schemas.openxmlformats.org/drawingml/2006/main" xmlns:r="http://schemas.openxmlformats.org/officeDocument/2006/relationships" xmlns:p="http://schemas.openxmlformats.org/presentationml/2006/main">
+  <p:cSld>
+    <p:spTree>
+      <p:nvGrpSpPr>
+        <p:cNvPr id="1" name=""/>
+        <p:cNvGrpSpPr/>
+        <p:nvPr/>
+      </p:nvGrpSpPr>
+      <p:grpSpPr>
+        <a:xfrm>
+          <a:off x="0" y="0"/>
+          <a:ext cx="0" cy="0"/>
+          <a:chOff x="0" y="0"/>
+          <a:chExt cx="0" cy="0"/>
+        </a:xfrm>
+      </p:grpSpPr>
+      <p:sp>
+        <p:nvSpPr>
+          <p:cNvPr id="2" name="Title 1">
+            <a:extLst>
+              <a:ext uri="{FF2B5EF4-FFF2-40B4-BE49-F238E27FC236}">
+                <a16:creationId xmlns:a16="http://schemas.microsoft.com/office/drawing/2014/main" id="{D49D0B6E-3D07-4C7C-99BB-FE4BA517C483}"/>
+              </a:ext>
+            </a:extLst>
+          </p:cNvPr>
+          <p:cNvSpPr>
+            <a:spLocks noGrp="1"/>
+          </p:cNvSpPr>
+          <p:nvPr>
+            <p:ph type="title"/>
+          </p:nvPr>
+        </p:nvSpPr>
+        <p:spPr/>
+        <p:txBody>
+          <a:bodyPr/>
+          <a:lstStyle/>
+          <a:p>
+            <a:r>
+              <a:rPr lang="nb-NO" dirty="0">
+                <a:solidFill>
+                  <a:schemeClr val="tx1"/>
+                </a:solidFill>
+              </a:rPr>
+              <a:t>Model </a:t>
+            </a:r>
+            <a:r>
+              <a:rPr lang="nb-NO" dirty="0" err="1">
+                <a:solidFill>
+                  <a:schemeClr val="tx1"/>
+                </a:solidFill>
+              </a:rPr>
+              <a:t>configs</a:t>
+            </a:r>
+            <a:endParaRPr lang="en-GB" dirty="0">
+              <a:solidFill>
+                <a:schemeClr val="tx1"/>
+              </a:solidFill>
+            </a:endParaRPr>
+          </a:p>
+        </p:txBody>
+      </p:sp>
+      <p:sp>
+        <p:nvSpPr>
+          <p:cNvPr id="3" name="Content Placeholder 2">
+            <a:extLst>
+              <a:ext uri="{FF2B5EF4-FFF2-40B4-BE49-F238E27FC236}">
+                <a16:creationId xmlns:a16="http://schemas.microsoft.com/office/drawing/2014/main" id="{3FA04A3F-FAD4-4221-B898-49AA0B68DF18}"/>
+              </a:ext>
+            </a:extLst>
+          </p:cNvPr>
+          <p:cNvSpPr>
+            <a:spLocks noGrp="1"/>
+          </p:cNvSpPr>
+          <p:nvPr>
+            <p:ph idx="1"/>
+          </p:nvPr>
+        </p:nvSpPr>
+        <p:spPr>
+          <a:xfrm>
+            <a:off x="676656" y="2011680"/>
+            <a:ext cx="5743599" cy="3766185"/>
+          </a:xfrm>
+        </p:spPr>
+        <p:txBody>
+          <a:bodyPr>
+            <a:normAutofit lnSpcReduction="10000"/>
+          </a:bodyPr>
+          <a:lstStyle/>
+          <a:p>
+            <a:r>
+              <a:rPr lang="nb-NO" dirty="0" err="1"/>
+              <a:t>These</a:t>
+            </a:r>
+            <a:r>
+              <a:rPr lang="nb-NO" dirty="0"/>
+              <a:t> </a:t>
+            </a:r>
+            <a:r>
+              <a:rPr lang="nb-NO" dirty="0" err="1"/>
+              <a:t>are</a:t>
+            </a:r>
+            <a:r>
+              <a:rPr lang="nb-NO" dirty="0"/>
+              <a:t> </a:t>
+            </a:r>
+            <a:r>
+              <a:rPr lang="nb-NO" dirty="0" err="1"/>
+              <a:t>saved</a:t>
+            </a:r>
+            <a:r>
+              <a:rPr lang="nb-NO" dirty="0"/>
+              <a:t> in </a:t>
+            </a:r>
+            <a:r>
+              <a:rPr lang="nb-NO" dirty="0" err="1"/>
+              <a:t>the</a:t>
+            </a:r>
+            <a:r>
+              <a:rPr lang="nb-NO" dirty="0"/>
+              <a:t> .</a:t>
+            </a:r>
+            <a:r>
+              <a:rPr lang="nb-NO" dirty="0" err="1"/>
+              <a:t>json</a:t>
+            </a:r>
+            <a:r>
+              <a:rPr lang="nb-NO" dirty="0"/>
+              <a:t> file</a:t>
+            </a:r>
+          </a:p>
+          <a:p>
+            <a:endParaRPr lang="nb-NO" dirty="0"/>
+          </a:p>
+          <a:p>
+            <a:r>
+              <a:rPr lang="nb-NO" dirty="0" err="1"/>
+              <a:t>These</a:t>
+            </a:r>
+            <a:r>
+              <a:rPr lang="nb-NO" dirty="0"/>
+              <a:t> parameters </a:t>
+            </a:r>
+            <a:r>
+              <a:rPr lang="nb-NO" dirty="0" err="1"/>
+              <a:t>get</a:t>
+            </a:r>
+            <a:r>
+              <a:rPr lang="nb-NO" dirty="0"/>
+              <a:t> </a:t>
+            </a:r>
+            <a:r>
+              <a:rPr lang="nb-NO" dirty="0" err="1"/>
+              <a:t>tweaked</a:t>
+            </a:r>
+            <a:r>
+              <a:rPr lang="nb-NO" dirty="0"/>
+              <a:t> by </a:t>
+            </a:r>
+            <a:r>
+              <a:rPr lang="nb-NO" dirty="0" err="1"/>
+              <a:t>optuna</a:t>
+            </a:r>
+            <a:r>
+              <a:rPr lang="nb-NO" dirty="0"/>
+              <a:t>, so I save </a:t>
+            </a:r>
+            <a:r>
+              <a:rPr lang="nb-NO" dirty="0" err="1"/>
+              <a:t>them</a:t>
+            </a:r>
+            <a:r>
+              <a:rPr lang="nb-NO" dirty="0"/>
+              <a:t> to be </a:t>
+            </a:r>
+            <a:r>
+              <a:rPr lang="nb-NO" dirty="0" err="1"/>
+              <a:t>able</a:t>
+            </a:r>
+            <a:r>
+              <a:rPr lang="nb-NO" dirty="0"/>
+              <a:t> to </a:t>
+            </a:r>
+            <a:r>
+              <a:rPr lang="nb-NO" dirty="0" err="1"/>
+              <a:t>compare</a:t>
+            </a:r>
+            <a:r>
+              <a:rPr lang="nb-NO" dirty="0"/>
+              <a:t> </a:t>
+            </a:r>
+            <a:r>
+              <a:rPr lang="nb-NO" dirty="0" err="1"/>
+              <a:t>what</a:t>
+            </a:r>
+            <a:r>
+              <a:rPr lang="nb-NO" dirty="0"/>
+              <a:t> </a:t>
+            </a:r>
+            <a:r>
+              <a:rPr lang="nb-NO" dirty="0" err="1"/>
+              <a:t>the</a:t>
+            </a:r>
+            <a:r>
+              <a:rPr lang="nb-NO" dirty="0"/>
+              <a:t> </a:t>
+            </a:r>
+            <a:r>
+              <a:rPr lang="nb-NO" dirty="0" err="1"/>
+              <a:t>good</a:t>
+            </a:r>
+            <a:r>
+              <a:rPr lang="nb-NO" dirty="0"/>
+              <a:t> </a:t>
+            </a:r>
+            <a:r>
+              <a:rPr lang="nb-NO" dirty="0" err="1"/>
+              <a:t>performing</a:t>
+            </a:r>
+            <a:r>
+              <a:rPr lang="nb-NO" dirty="0"/>
+              <a:t> </a:t>
+            </a:r>
+            <a:r>
+              <a:rPr lang="nb-NO" dirty="0" err="1"/>
+              <a:t>models</a:t>
+            </a:r>
+            <a:r>
+              <a:rPr lang="nb-NO" dirty="0"/>
+              <a:t> have in </a:t>
+            </a:r>
+            <a:r>
+              <a:rPr lang="nb-NO" dirty="0" err="1"/>
+              <a:t>common</a:t>
+            </a:r>
+            <a:endParaRPr lang="nb-NO" dirty="0"/>
+          </a:p>
+          <a:p>
+            <a:endParaRPr lang="nb-NO" dirty="0"/>
+          </a:p>
+          <a:p>
+            <a:r>
+              <a:rPr lang="nb-NO" dirty="0"/>
+              <a:t>Planning to </a:t>
+            </a:r>
+            <a:r>
+              <a:rPr lang="nb-NO" dirty="0" err="1"/>
+              <a:t>add</a:t>
+            </a:r>
+            <a:r>
+              <a:rPr lang="nb-NO" dirty="0"/>
+              <a:t> ‘</a:t>
+            </a:r>
+            <a:r>
+              <a:rPr lang="nb-NO" dirty="0" err="1"/>
+              <a:t>feat_aug_dataset</a:t>
+            </a:r>
+            <a:r>
+              <a:rPr lang="nb-NO" dirty="0"/>
+              <a:t>’ to have </a:t>
+            </a:r>
+            <a:r>
+              <a:rPr lang="nb-NO" dirty="0" err="1"/>
+              <a:t>optuna</a:t>
+            </a:r>
+            <a:r>
+              <a:rPr lang="nb-NO" dirty="0"/>
+              <a:t> </a:t>
+            </a:r>
+            <a:r>
+              <a:rPr lang="nb-NO" dirty="0" err="1"/>
+              <a:t>decide</a:t>
+            </a:r>
+            <a:r>
+              <a:rPr lang="nb-NO" dirty="0"/>
+              <a:t> </a:t>
+            </a:r>
+            <a:r>
+              <a:rPr lang="nb-NO" dirty="0" err="1"/>
+              <a:t>what</a:t>
+            </a:r>
+            <a:r>
+              <a:rPr lang="nb-NO" dirty="0"/>
+              <a:t> </a:t>
+            </a:r>
+            <a:r>
+              <a:rPr lang="nb-NO" dirty="0" err="1"/>
+              <a:t>additional</a:t>
+            </a:r>
+            <a:r>
+              <a:rPr lang="nb-NO" dirty="0"/>
+              <a:t> data </a:t>
+            </a:r>
+            <a:r>
+              <a:rPr lang="nb-NO" dirty="0" err="1"/>
+              <a:t>preprocessing</a:t>
+            </a:r>
+            <a:r>
+              <a:rPr lang="nb-NO" dirty="0"/>
+              <a:t> is </a:t>
+            </a:r>
+            <a:r>
+              <a:rPr lang="nb-NO" dirty="0" err="1"/>
+              <a:t>preferable</a:t>
+            </a:r>
+            <a:endParaRPr lang="en-GB" dirty="0"/>
+          </a:p>
+        </p:txBody>
+      </p:sp>
+      <p:pic>
+        <p:nvPicPr>
+          <p:cNvPr id="5" name="Picture 4">
+            <a:extLst>
+              <a:ext uri="{FF2B5EF4-FFF2-40B4-BE49-F238E27FC236}">
+                <a16:creationId xmlns:a16="http://schemas.microsoft.com/office/drawing/2014/main" id="{81C685BA-F863-43CF-9939-1BC0386BC08A}"/>
+              </a:ext>
+            </a:extLst>
+          </p:cNvPr>
+          <p:cNvPicPr>
+            <a:picLocks noChangeAspect="1"/>
+          </p:cNvPicPr>
+          <p:nvPr/>
+        </p:nvPicPr>
+        <p:blipFill>
+          <a:blip r:embed="rId2"/>
+          <a:stretch>
+            <a:fillRect/>
+          </a:stretch>
+        </p:blipFill>
+        <p:spPr>
+          <a:xfrm>
+            <a:off x="7135542" y="1453515"/>
+            <a:ext cx="3990975" cy="4324350"/>
+          </a:xfrm>
+          <a:prstGeom prst="rect">
+            <a:avLst/>
+          </a:prstGeom>
+        </p:spPr>
+      </p:pic>
+    </p:spTree>
+    <p:extLst>
+      <p:ext uri="{BB962C8B-B14F-4D97-AF65-F5344CB8AC3E}">
+        <p14:creationId xmlns:p14="http://schemas.microsoft.com/office/powerpoint/2010/main" val="3208444305"/>
+      </p:ext>
+    </p:extLst>
+  </p:cSld>
+  <p:clrMapOvr>
+    <a:masterClrMapping/>
+  </p:clrMapOvr>
+</p:sld>
+</file>
+
+<file path=ppt/slides/slide7.xml><?xml version="1.0" encoding="utf-8"?>
+<p:sld xmlns:a="http://schemas.openxmlformats.org/drawingml/2006/main" xmlns:r="http://schemas.openxmlformats.org/officeDocument/2006/relationships" xmlns:p="http://schemas.openxmlformats.org/presentationml/2006/main">
+  <p:cSld>
+    <p:spTree>
+      <p:nvGrpSpPr>
+        <p:cNvPr id="1" name=""/>
+        <p:cNvGrpSpPr/>
+        <p:nvPr/>
+      </p:nvGrpSpPr>
+      <p:grpSpPr>
+        <a:xfrm>
+          <a:off x="0" y="0"/>
+          <a:ext cx="0" cy="0"/>
+          <a:chOff x="0" y="0"/>
+          <a:chExt cx="0" cy="0"/>
+        </a:xfrm>
+      </p:grpSpPr>
+      <p:sp>
+        <p:nvSpPr>
+          <p:cNvPr id="2" name="Title 1">
+            <a:extLst>
+              <a:ext uri="{FF2B5EF4-FFF2-40B4-BE49-F238E27FC236}">
+                <a16:creationId xmlns:a16="http://schemas.microsoft.com/office/drawing/2014/main" id="{627BF425-BA66-4C92-93AF-D351F8D6410E}"/>
+              </a:ext>
+            </a:extLst>
+          </p:cNvPr>
+          <p:cNvSpPr>
+            <a:spLocks noGrp="1"/>
+          </p:cNvSpPr>
+          <p:nvPr>
+            <p:ph type="title"/>
+          </p:nvPr>
+        </p:nvSpPr>
+        <p:spPr/>
+        <p:txBody>
+          <a:bodyPr/>
+          <a:lstStyle/>
+          <a:p>
+            <a:r>
+              <a:rPr lang="nb-NO" dirty="0" err="1">
+                <a:solidFill>
+                  <a:schemeClr val="tx1"/>
+                </a:solidFill>
+              </a:rPr>
+              <a:t>Reconstruction</a:t>
+            </a:r>
+            <a:endParaRPr lang="en-GB" dirty="0">
+              <a:solidFill>
+                <a:schemeClr val="tx1"/>
+              </a:solidFill>
+            </a:endParaRPr>
+          </a:p>
+        </p:txBody>
+      </p:sp>
+      <p:pic>
+        <p:nvPicPr>
+          <p:cNvPr id="5" name="Content Placeholder 4" descr="A picture containing blue&#10;&#10;Description automatically generated">
+            <a:extLst>
+              <a:ext uri="{FF2B5EF4-FFF2-40B4-BE49-F238E27FC236}">
+                <a16:creationId xmlns:a16="http://schemas.microsoft.com/office/drawing/2014/main" id="{154A3C1F-4C64-47CA-80FF-4E89DDA7845F}"/>
+              </a:ext>
+            </a:extLst>
+          </p:cNvPr>
+          <p:cNvPicPr>
+            <a:picLocks noGrp="1" noChangeAspect="1"/>
+          </p:cNvPicPr>
+          <p:nvPr>
+            <p:ph idx="1"/>
+          </p:nvPr>
+        </p:nvPicPr>
+        <p:blipFill>
+          <a:blip r:embed="rId2">
+            <a:extLst>
+              <a:ext uri="{28A0092B-C50C-407E-A947-70E740481C1C}">
+                <a14:useLocalDpi xmlns:a14="http://schemas.microsoft.com/office/drawing/2010/main" val="0"/>
+              </a:ext>
+            </a:extLst>
+          </a:blip>
+          <a:stretch>
+            <a:fillRect/>
+          </a:stretch>
+        </p:blipFill>
+        <p:spPr>
+          <a:xfrm>
+            <a:off x="1211296" y="2314964"/>
+            <a:ext cx="4438650" cy="3333750"/>
+          </a:xfrm>
+        </p:spPr>
+      </p:pic>
+      <p:pic>
+        <p:nvPicPr>
+          <p:cNvPr id="7" name="Picture 6" descr="A picture containing blue, painted, fabric&#10;&#10;Description automatically generated">
+            <a:extLst>
+              <a:ext uri="{FF2B5EF4-FFF2-40B4-BE49-F238E27FC236}">
+                <a16:creationId xmlns:a16="http://schemas.microsoft.com/office/drawing/2014/main" id="{73A19980-46F4-458B-BF53-91409671D19F}"/>
+              </a:ext>
+            </a:extLst>
+          </p:cNvPr>
+          <p:cNvPicPr>
+            <a:picLocks noChangeAspect="1"/>
+          </p:cNvPicPr>
+          <p:nvPr/>
+        </p:nvPicPr>
+        <p:blipFill>
+          <a:blip r:embed="rId3">
+            <a:extLst>
+              <a:ext uri="{28A0092B-C50C-407E-A947-70E740481C1C}">
+                <a14:useLocalDpi xmlns:a14="http://schemas.microsoft.com/office/drawing/2010/main" val="0"/>
+              </a:ext>
+            </a:extLst>
+          </a:blip>
+          <a:stretch>
+            <a:fillRect/>
+          </a:stretch>
+        </p:blipFill>
+        <p:spPr>
+          <a:xfrm>
+            <a:off x="6405867" y="2314964"/>
+            <a:ext cx="4438650" cy="3333750"/>
+          </a:xfrm>
+          <a:prstGeom prst="rect">
+            <a:avLst/>
+          </a:prstGeom>
+        </p:spPr>
+      </p:pic>
+    </p:spTree>
+    <p:extLst>
+      <p:ext uri="{BB962C8B-B14F-4D97-AF65-F5344CB8AC3E}">
+        <p14:creationId xmlns:p14="http://schemas.microsoft.com/office/powerpoint/2010/main" val="218628252"/>
+      </p:ext>
+    </p:extLst>
+  </p:cSld>
+  <p:clrMapOvr>
+    <a:masterClrMapping/>
+  </p:clrMapOvr>
+</p:sld>
+</file>
+
+<file path=ppt/slides/slide8.xml><?xml version="1.0" encoding="utf-8"?>
+<p:sld xmlns:a="http://schemas.openxmlformats.org/drawingml/2006/main" xmlns:r="http://schemas.openxmlformats.org/officeDocument/2006/relationships" xmlns:p="http://schemas.openxmlformats.org/presentationml/2006/main">
+  <p:cSld>
+    <p:spTree>
+      <p:nvGrpSpPr>
+        <p:cNvPr id="1" name=""/>
+        <p:cNvGrpSpPr/>
+        <p:nvPr/>
+      </p:nvGrpSpPr>
+      <p:grpSpPr>
+        <a:xfrm>
+          <a:off x="0" y="0"/>
+          <a:ext cx="0" cy="0"/>
+          <a:chOff x="0" y="0"/>
+          <a:chExt cx="0" cy="0"/>
+        </a:xfrm>
+      </p:grpSpPr>
+      <p:sp>
+        <p:nvSpPr>
+          <p:cNvPr id="2" name="Title 1">
+            <a:extLst>
+              <a:ext uri="{FF2B5EF4-FFF2-40B4-BE49-F238E27FC236}">
+                <a16:creationId xmlns:a16="http://schemas.microsoft.com/office/drawing/2014/main" id="{03B84BDC-68B3-487A-916F-19C1B1BCE58F}"/>
+              </a:ext>
+            </a:extLst>
+          </p:cNvPr>
+          <p:cNvSpPr>
+            <a:spLocks noGrp="1"/>
+          </p:cNvSpPr>
+          <p:nvPr>
+            <p:ph type="title"/>
+          </p:nvPr>
+        </p:nvSpPr>
+        <p:spPr/>
+        <p:txBody>
+          <a:bodyPr>
+            <a:normAutofit/>
+          </a:bodyPr>
+          <a:lstStyle/>
+          <a:p>
+            <a:r>
+              <a:rPr lang="nb-NO" sz="4800" dirty="0">
+                <a:solidFill>
+                  <a:schemeClr val="tx1"/>
+                </a:solidFill>
+              </a:rPr>
+              <a:t>Not just a </a:t>
+            </a:r>
+            <a:r>
+              <a:rPr lang="nb-NO" sz="4800" dirty="0" err="1">
+                <a:solidFill>
+                  <a:schemeClr val="tx1"/>
+                </a:solidFill>
+              </a:rPr>
+              <a:t>kernel</a:t>
+            </a:r>
+            <a:r>
+              <a:rPr lang="nb-NO" sz="4800" dirty="0">
+                <a:solidFill>
+                  <a:schemeClr val="tx1"/>
+                </a:solidFill>
+              </a:rPr>
+              <a:t> </a:t>
+            </a:r>
+            <a:r>
+              <a:rPr lang="nb-NO" sz="4800" dirty="0" err="1">
+                <a:solidFill>
+                  <a:schemeClr val="tx1"/>
+                </a:solidFill>
+              </a:rPr>
+              <a:t>size</a:t>
+            </a:r>
+            <a:r>
+              <a:rPr lang="nb-NO" sz="4800" dirty="0">
+                <a:solidFill>
+                  <a:schemeClr val="tx1"/>
+                </a:solidFill>
+              </a:rPr>
+              <a:t> </a:t>
+            </a:r>
+            <a:r>
+              <a:rPr lang="nb-NO" sz="4800" dirty="0" err="1">
+                <a:solidFill>
+                  <a:schemeClr val="tx1"/>
+                </a:solidFill>
+              </a:rPr>
+              <a:t>issue</a:t>
+            </a:r>
+            <a:r>
+              <a:rPr lang="nb-NO" sz="4800" dirty="0">
+                <a:solidFill>
+                  <a:schemeClr val="tx1"/>
+                </a:solidFill>
+              </a:rPr>
+              <a:t> (</a:t>
+            </a:r>
+            <a:r>
+              <a:rPr lang="nb-NO" sz="4800" dirty="0" err="1">
+                <a:solidFill>
+                  <a:schemeClr val="tx1"/>
+                </a:solidFill>
+              </a:rPr>
+              <a:t>these</a:t>
+            </a:r>
+            <a:r>
+              <a:rPr lang="nb-NO" sz="4800" dirty="0">
+                <a:solidFill>
+                  <a:schemeClr val="tx1"/>
+                </a:solidFill>
+              </a:rPr>
+              <a:t> </a:t>
+            </a:r>
+            <a:r>
+              <a:rPr lang="nb-NO" sz="4800" dirty="0" err="1">
+                <a:solidFill>
+                  <a:schemeClr val="tx1"/>
+                </a:solidFill>
+              </a:rPr>
+              <a:t>had</a:t>
+            </a:r>
+            <a:r>
+              <a:rPr lang="nb-NO" sz="4800" dirty="0">
+                <a:solidFill>
+                  <a:schemeClr val="tx1"/>
+                </a:solidFill>
+              </a:rPr>
+              <a:t> </a:t>
+            </a:r>
+            <a:r>
+              <a:rPr lang="nb-NO" sz="4800" dirty="0" err="1">
+                <a:solidFill>
+                  <a:schemeClr val="tx1"/>
+                </a:solidFill>
+              </a:rPr>
+              <a:t>ks</a:t>
+            </a:r>
+            <a:r>
+              <a:rPr lang="nb-NO" sz="4800" dirty="0">
+                <a:solidFill>
+                  <a:schemeClr val="tx1"/>
+                </a:solidFill>
+              </a:rPr>
+              <a:t>=8)</a:t>
+            </a:r>
+            <a:endParaRPr lang="en-GB" sz="4800" dirty="0">
+              <a:solidFill>
+                <a:schemeClr val="tx1"/>
+              </a:solidFill>
+            </a:endParaRPr>
+          </a:p>
+        </p:txBody>
+      </p:sp>
+      <p:pic>
+        <p:nvPicPr>
+          <p:cNvPr id="5" name="Content Placeholder 4" descr="A picture containing text, screenshot&#10;&#10;Description automatically generated">
+            <a:extLst>
+              <a:ext uri="{FF2B5EF4-FFF2-40B4-BE49-F238E27FC236}">
+                <a16:creationId xmlns:a16="http://schemas.microsoft.com/office/drawing/2014/main" id="{F589CBC7-A990-43CA-8981-59B32C742CFF}"/>
+              </a:ext>
+            </a:extLst>
+          </p:cNvPr>
+          <p:cNvPicPr>
+            <a:picLocks noGrp="1" noChangeAspect="1"/>
+          </p:cNvPicPr>
+          <p:nvPr>
+            <p:ph idx="1"/>
+          </p:nvPr>
+        </p:nvPicPr>
+        <p:blipFill>
+          <a:blip r:embed="rId2">
+            <a:extLst>
+              <a:ext uri="{28A0092B-C50C-407E-A947-70E740481C1C}">
+                <a14:useLocalDpi xmlns:a14="http://schemas.microsoft.com/office/drawing/2010/main" val="0"/>
+              </a:ext>
+            </a:extLst>
+          </a:blip>
+          <a:stretch>
+            <a:fillRect/>
+          </a:stretch>
+        </p:blipFill>
+        <p:spPr>
+          <a:xfrm>
+            <a:off x="1182113" y="1888585"/>
+            <a:ext cx="4438650" cy="3333750"/>
+          </a:xfrm>
+        </p:spPr>
+      </p:pic>
+      <p:pic>
+        <p:nvPicPr>
+          <p:cNvPr id="7" name="Picture 6" descr="A picture containing text, screenshot&#10;&#10;Description automatically generated">
+            <a:extLst>
+              <a:ext uri="{FF2B5EF4-FFF2-40B4-BE49-F238E27FC236}">
+                <a16:creationId xmlns:a16="http://schemas.microsoft.com/office/drawing/2014/main" id="{457D4CC2-021B-4A7F-B3FE-B1389F3A333B}"/>
+              </a:ext>
+            </a:extLst>
+          </p:cNvPr>
+          <p:cNvPicPr>
+            <a:picLocks noChangeAspect="1"/>
+          </p:cNvPicPr>
+          <p:nvPr/>
+        </p:nvPicPr>
+        <p:blipFill>
+          <a:blip r:embed="rId3">
+            <a:extLst>
+              <a:ext uri="{28A0092B-C50C-407E-A947-70E740481C1C}">
+                <a14:useLocalDpi xmlns:a14="http://schemas.microsoft.com/office/drawing/2010/main" val="0"/>
+              </a:ext>
+            </a:extLst>
+          </a:blip>
+          <a:stretch>
+            <a:fillRect/>
+          </a:stretch>
+        </p:blipFill>
+        <p:spPr>
+          <a:xfrm>
+            <a:off x="6483687" y="1888585"/>
+            <a:ext cx="4438650" cy="3333750"/>
+          </a:xfrm>
+          <a:prstGeom prst="rect">
+            <a:avLst/>
+          </a:prstGeom>
+        </p:spPr>
+      </p:pic>
+    </p:spTree>
+    <p:extLst>
+      <p:ext uri="{BB962C8B-B14F-4D97-AF65-F5344CB8AC3E}">
+        <p14:creationId xmlns:p14="http://schemas.microsoft.com/office/powerpoint/2010/main" val="2778917961"/>
+      </p:ext>
+    </p:extLst>
+  </p:cSld>
+  <p:clrMapOvr>
+    <a:masterClrMapping/>
+  </p:clrMapOvr>
+</p:sld>
+</file>
+
+<file path=ppt/slides/slide9.xml><?xml version="1.0" encoding="utf-8"?>
+<p:sld xmlns:a="http://schemas.openxmlformats.org/drawingml/2006/main" xmlns:r="http://schemas.openxmlformats.org/officeDocument/2006/relationships" xmlns:p="http://schemas.openxmlformats.org/presentationml/2006/main">
+  <p:cSld>
+    <p:spTree>
+      <p:nvGrpSpPr>
+        <p:cNvPr id="1" name=""/>
+        <p:cNvGrpSpPr/>
+        <p:nvPr/>
+      </p:nvGrpSpPr>
+      <p:grpSpPr>
+        <a:xfrm>
+          <a:off x="0" y="0"/>
+          <a:ext cx="0" cy="0"/>
+          <a:chOff x="0" y="0"/>
+          <a:chExt cx="0" cy="0"/>
+        </a:xfrm>
+      </p:grpSpPr>
+      <p:sp>
+        <p:nvSpPr>
+          <p:cNvPr id="2" name="Title 1">
+            <a:extLst>
+              <a:ext uri="{FF2B5EF4-FFF2-40B4-BE49-F238E27FC236}">
+                <a16:creationId xmlns:a16="http://schemas.microsoft.com/office/drawing/2014/main" id="{E36C5BE7-EB5D-407C-805E-ADE99408FFFB}"/>
+              </a:ext>
+            </a:extLst>
+          </p:cNvPr>
+          <p:cNvSpPr>
+            <a:spLocks noGrp="1"/>
+          </p:cNvSpPr>
+          <p:nvPr>
+            <p:ph type="title"/>
+          </p:nvPr>
+        </p:nvSpPr>
+        <p:spPr/>
+        <p:txBody>
+          <a:bodyPr>
+            <a:normAutofit/>
+          </a:bodyPr>
+          <a:lstStyle/>
+          <a:p>
+            <a:r>
+              <a:rPr lang="nb-NO" sz="4000" dirty="0" err="1">
+                <a:solidFill>
+                  <a:schemeClr val="tx1"/>
+                </a:solidFill>
+              </a:rPr>
+              <a:t>Errors</a:t>
+            </a:r>
+            <a:r>
+              <a:rPr lang="nb-NO" sz="4000" dirty="0">
+                <a:solidFill>
+                  <a:schemeClr val="tx1"/>
+                </a:solidFill>
+              </a:rPr>
+              <a:t> </a:t>
+            </a:r>
+            <a:r>
+              <a:rPr lang="nb-NO" sz="4000" dirty="0" err="1">
+                <a:solidFill>
+                  <a:schemeClr val="tx1"/>
+                </a:solidFill>
+              </a:rPr>
+              <a:t>might</a:t>
+            </a:r>
+            <a:r>
+              <a:rPr lang="nb-NO" sz="4000" dirty="0">
+                <a:solidFill>
+                  <a:schemeClr val="tx1"/>
+                </a:solidFill>
+              </a:rPr>
+              <a:t> just be bad regions </a:t>
+            </a:r>
+            <a:r>
+              <a:rPr lang="nb-NO" sz="4000" dirty="0" err="1">
+                <a:solidFill>
+                  <a:schemeClr val="tx1"/>
+                </a:solidFill>
+              </a:rPr>
+              <a:t>of</a:t>
+            </a:r>
+            <a:r>
+              <a:rPr lang="nb-NO" sz="4000" dirty="0">
+                <a:solidFill>
+                  <a:schemeClr val="tx1"/>
+                </a:solidFill>
+              </a:rPr>
+              <a:t> loss landscape</a:t>
+            </a:r>
+            <a:endParaRPr lang="en-GB" sz="4000" dirty="0">
+              <a:solidFill>
+                <a:schemeClr val="tx1"/>
+              </a:solidFill>
+            </a:endParaRPr>
+          </a:p>
+        </p:txBody>
+      </p:sp>
+      <p:pic>
+        <p:nvPicPr>
+          <p:cNvPr id="5" name="Content Placeholder 4">
+            <a:extLst>
+              <a:ext uri="{FF2B5EF4-FFF2-40B4-BE49-F238E27FC236}">
+                <a16:creationId xmlns:a16="http://schemas.microsoft.com/office/drawing/2014/main" id="{3B89FBB7-DF56-48EC-8756-0059E7798100}"/>
+              </a:ext>
+            </a:extLst>
+          </p:cNvPr>
+          <p:cNvPicPr>
+            <a:picLocks noGrp="1" noChangeAspect="1"/>
+          </p:cNvPicPr>
+          <p:nvPr>
+            <p:ph idx="1"/>
+          </p:nvPr>
+        </p:nvPicPr>
+        <p:blipFill>
+          <a:blip r:embed="rId2"/>
+          <a:stretch>
+            <a:fillRect/>
+          </a:stretch>
+        </p:blipFill>
+        <p:spPr>
+          <a:xfrm>
+            <a:off x="1809750" y="2013744"/>
+            <a:ext cx="8486775" cy="3762375"/>
+          </a:xfrm>
+        </p:spPr>
+      </p:pic>
+    </p:spTree>
+    <p:extLst>
+      <p:ext uri="{BB962C8B-B14F-4D97-AF65-F5344CB8AC3E}">
+        <p14:creationId xmlns:p14="http://schemas.microsoft.com/office/powerpoint/2010/main" val="2971230527"/>
       </p:ext>
     </p:extLst>
   </p:cSld>

</xml_diff>

<commit_message>
Bug fix for pred image
</commit_message>
<xml_diff>
--- a/Meeting Presentations/03.11.2022_General_meeting.pptx
+++ b/Meeting Presentations/03.11.2022_General_meeting.pptx
@@ -18,8 +18,9 @@
     <p:sldId id="265" r:id="rId12"/>
     <p:sldId id="267" r:id="rId13"/>
     <p:sldId id="268" r:id="rId14"/>
-    <p:sldId id="269" r:id="rId15"/>
-    <p:sldId id="270" r:id="rId16"/>
+    <p:sldId id="271" r:id="rId15"/>
+    <p:sldId id="269" r:id="rId16"/>
+    <p:sldId id="270" r:id="rId17"/>
   </p:sldIdLst>
   <p:sldSz cx="12192000" cy="6858000"/>
   <p:notesSz cx="6858000" cy="9144000"/>
@@ -4665,6 +4666,9 @@
             </a:r>
           </a:p>
           <a:p>
+            <a:endParaRPr lang="nb-NO" dirty="0"/>
+          </a:p>
+          <a:p>
             <a:r>
               <a:rPr lang="nb-NO" dirty="0"/>
               <a:t>How to do </a:t>
@@ -5088,6 +5092,145 @@
           <p:cNvPr id="2" name="Title 1">
             <a:extLst>
               <a:ext uri="{FF2B5EF4-FFF2-40B4-BE49-F238E27FC236}">
+                <a16:creationId xmlns:a16="http://schemas.microsoft.com/office/drawing/2014/main" id="{660803DD-9907-4704-9344-C3C222CDC9E4}"/>
+              </a:ext>
+            </a:extLst>
+          </p:cNvPr>
+          <p:cNvSpPr>
+            <a:spLocks noGrp="1"/>
+          </p:cNvSpPr>
+          <p:nvPr>
+            <p:ph type="title"/>
+          </p:nvPr>
+        </p:nvSpPr>
+        <p:spPr/>
+        <p:txBody>
+          <a:bodyPr/>
+          <a:lstStyle/>
+          <a:p>
+            <a:r>
+              <a:rPr lang="nb-NO" dirty="0" err="1">
+                <a:solidFill>
+                  <a:schemeClr val="tx1"/>
+                </a:solidFill>
+              </a:rPr>
+              <a:t>Further</a:t>
+            </a:r>
+            <a:r>
+              <a:rPr lang="nb-NO" dirty="0">
+                <a:solidFill>
+                  <a:schemeClr val="tx1"/>
+                </a:solidFill>
+              </a:rPr>
+              <a:t> </a:t>
+            </a:r>
+            <a:r>
+              <a:rPr lang="nb-NO" dirty="0" err="1">
+                <a:solidFill>
+                  <a:schemeClr val="tx1"/>
+                </a:solidFill>
+              </a:rPr>
+              <a:t>work</a:t>
+            </a:r>
+            <a:endParaRPr lang="en-GB" dirty="0">
+              <a:solidFill>
+                <a:schemeClr val="tx1"/>
+              </a:solidFill>
+            </a:endParaRPr>
+          </a:p>
+        </p:txBody>
+      </p:sp>
+      <p:sp>
+        <p:nvSpPr>
+          <p:cNvPr id="3" name="Content Placeholder 2">
+            <a:extLst>
+              <a:ext uri="{FF2B5EF4-FFF2-40B4-BE49-F238E27FC236}">
+                <a16:creationId xmlns:a16="http://schemas.microsoft.com/office/drawing/2014/main" id="{026BC465-DC47-4EEB-B8DB-00AB00D26921}"/>
+              </a:ext>
+            </a:extLst>
+          </p:cNvPr>
+          <p:cNvSpPr>
+            <a:spLocks noGrp="1"/>
+          </p:cNvSpPr>
+          <p:nvPr>
+            <p:ph idx="1"/>
+          </p:nvPr>
+        </p:nvSpPr>
+        <p:spPr/>
+        <p:txBody>
+          <a:bodyPr/>
+          <a:lstStyle/>
+          <a:p>
+            <a:r>
+              <a:rPr lang="nb-NO" dirty="0" err="1"/>
+              <a:t>Geotechnical</a:t>
+            </a:r>
+            <a:r>
+              <a:rPr lang="nb-NO" dirty="0"/>
+              <a:t> parameters and </a:t>
+            </a:r>
+            <a:r>
+              <a:rPr lang="nb-NO" dirty="0" err="1"/>
+              <a:t>evaluating</a:t>
+            </a:r>
+            <a:r>
+              <a:rPr lang="nb-NO" dirty="0"/>
+              <a:t> </a:t>
+            </a:r>
+            <a:r>
+              <a:rPr lang="nb-NO" dirty="0" err="1"/>
+              <a:t>prediction</a:t>
+            </a:r>
+            <a:r>
+              <a:rPr lang="nb-NO" dirty="0"/>
+              <a:t> </a:t>
+            </a:r>
+            <a:r>
+              <a:rPr lang="nb-NO" dirty="0" err="1"/>
+              <a:t>capabilities</a:t>
+            </a:r>
+            <a:endParaRPr lang="nb-NO"/>
+          </a:p>
+          <a:p>
+            <a:endParaRPr lang="nb-NO"/>
+          </a:p>
+        </p:txBody>
+      </p:sp>
+    </p:spTree>
+    <p:extLst>
+      <p:ext uri="{BB962C8B-B14F-4D97-AF65-F5344CB8AC3E}">
+        <p14:creationId xmlns:p14="http://schemas.microsoft.com/office/powerpoint/2010/main" val="258436470"/>
+      </p:ext>
+    </p:extLst>
+  </p:cSld>
+  <p:clrMapOvr>
+    <a:masterClrMapping/>
+  </p:clrMapOvr>
+</p:sld>
+</file>
+
+<file path=ppt/slides/slide15.xml><?xml version="1.0" encoding="utf-8"?>
+<p:sld xmlns:a="http://schemas.openxmlformats.org/drawingml/2006/main" xmlns:r="http://schemas.openxmlformats.org/officeDocument/2006/relationships" xmlns:p="http://schemas.openxmlformats.org/presentationml/2006/main">
+  <p:cSld>
+    <p:spTree>
+      <p:nvGrpSpPr>
+        <p:cNvPr id="1" name=""/>
+        <p:cNvGrpSpPr/>
+        <p:nvPr/>
+      </p:nvGrpSpPr>
+      <p:grpSpPr>
+        <a:xfrm>
+          <a:off x="0" y="0"/>
+          <a:ext cx="0" cy="0"/>
+          <a:chOff x="0" y="0"/>
+          <a:chExt cx="0" cy="0"/>
+        </a:xfrm>
+      </p:grpSpPr>
+      <p:sp>
+        <p:nvSpPr>
+          <p:cNvPr id="2" name="Title 1">
+            <a:extLst>
+              <a:ext uri="{FF2B5EF4-FFF2-40B4-BE49-F238E27FC236}">
                 <a16:creationId xmlns:a16="http://schemas.microsoft.com/office/drawing/2014/main" id="{6B283408-BB91-4F30-AEBA-837D0C36FA3A}"/>
               </a:ext>
             </a:extLst>
@@ -5469,7 +5612,7 @@
 </p:sld>
 </file>
 
-<file path=ppt/slides/slide15.xml><?xml version="1.0" encoding="utf-8"?>
+<file path=ppt/slides/slide16.xml><?xml version="1.0" encoding="utf-8"?>
 <p:sld xmlns:a="http://schemas.openxmlformats.org/drawingml/2006/main" xmlns:r="http://schemas.openxmlformats.org/officeDocument/2006/relationships" xmlns:p="http://schemas.openxmlformats.org/presentationml/2006/main">
   <p:cSld>
     <p:spTree>
@@ -5678,9 +5821,23 @@
             </a:r>
           </a:p>
           <a:p>
-            <a:r>
-              <a:rPr lang="nb-NO" dirty="0"/>
-              <a:t>Status </a:t>
+            <a:endParaRPr lang="nb-NO" dirty="0"/>
+          </a:p>
+          <a:p>
+            <a:endParaRPr lang="nb-NO" dirty="0"/>
+          </a:p>
+          <a:p>
+            <a:r>
+              <a:rPr lang="nb-NO" dirty="0"/>
+              <a:t>This </a:t>
+            </a:r>
+            <a:r>
+              <a:rPr lang="nb-NO" dirty="0" err="1"/>
+              <a:t>will</a:t>
+            </a:r>
+            <a:r>
+              <a:rPr lang="nb-NO" dirty="0"/>
+              <a:t> be a status </a:t>
             </a:r>
             <a:r>
               <a:rPr lang="nb-NO" dirty="0" err="1"/>

</xml_diff>